<commit_message>
now can display 3D model from Quixelgit add *!
</commit_message>
<xml_diff>
--- a/未来修改.pptx
+++ b/未来修改.pptx
@@ -6,7 +6,10 @@
   </p:sldMasterIdLst>
   <p:sldIdLst>
     <p:sldId id="256" r:id="rId2"/>
-    <p:sldId id="257" r:id="rId3"/>
+    <p:sldId id="260" r:id="rId3"/>
+    <p:sldId id="257" r:id="rId4"/>
+    <p:sldId id="258" r:id="rId5"/>
+    <p:sldId id="259" r:id="rId6"/>
   </p:sldIdLst>
   <p:sldSz cx="12192000" cy="6858000"/>
   <p:notesSz cx="6858000" cy="9144000"/>
@@ -244,7 +247,7 @@
           <a:p>
             <a:fld id="{2B65E6A6-E877-45D0-B8F9-A137E1AC6DD2}" type="datetimeFigureOut">
               <a:rPr lang="zh-CN" altLang="en-US" smtClean="0"/>
-              <a:t>2021/2/27</a:t>
+              <a:t>2021/3/1</a:t>
             </a:fld>
             <a:endParaRPr lang="zh-CN" altLang="en-US"/>
           </a:p>
@@ -414,7 +417,7 @@
           <a:p>
             <a:fld id="{2B65E6A6-E877-45D0-B8F9-A137E1AC6DD2}" type="datetimeFigureOut">
               <a:rPr lang="zh-CN" altLang="en-US" smtClean="0"/>
-              <a:t>2021/2/27</a:t>
+              <a:t>2021/3/1</a:t>
             </a:fld>
             <a:endParaRPr lang="zh-CN" altLang="en-US"/>
           </a:p>
@@ -594,7 +597,7 @@
           <a:p>
             <a:fld id="{2B65E6A6-E877-45D0-B8F9-A137E1AC6DD2}" type="datetimeFigureOut">
               <a:rPr lang="zh-CN" altLang="en-US" smtClean="0"/>
-              <a:t>2021/2/27</a:t>
+              <a:t>2021/3/1</a:t>
             </a:fld>
             <a:endParaRPr lang="zh-CN" altLang="en-US"/>
           </a:p>
@@ -764,7 +767,7 @@
           <a:p>
             <a:fld id="{2B65E6A6-E877-45D0-B8F9-A137E1AC6DD2}" type="datetimeFigureOut">
               <a:rPr lang="zh-CN" altLang="en-US" smtClean="0"/>
-              <a:t>2021/2/27</a:t>
+              <a:t>2021/3/1</a:t>
             </a:fld>
             <a:endParaRPr lang="zh-CN" altLang="en-US"/>
           </a:p>
@@ -1010,7 +1013,7 @@
           <a:p>
             <a:fld id="{2B65E6A6-E877-45D0-B8F9-A137E1AC6DD2}" type="datetimeFigureOut">
               <a:rPr lang="zh-CN" altLang="en-US" smtClean="0"/>
-              <a:t>2021/2/27</a:t>
+              <a:t>2021/3/1</a:t>
             </a:fld>
             <a:endParaRPr lang="zh-CN" altLang="en-US"/>
           </a:p>
@@ -1242,7 +1245,7 @@
           <a:p>
             <a:fld id="{2B65E6A6-E877-45D0-B8F9-A137E1AC6DD2}" type="datetimeFigureOut">
               <a:rPr lang="zh-CN" altLang="en-US" smtClean="0"/>
-              <a:t>2021/2/27</a:t>
+              <a:t>2021/3/1</a:t>
             </a:fld>
             <a:endParaRPr lang="zh-CN" altLang="en-US"/>
           </a:p>
@@ -1609,7 +1612,7 @@
           <a:p>
             <a:fld id="{2B65E6A6-E877-45D0-B8F9-A137E1AC6DD2}" type="datetimeFigureOut">
               <a:rPr lang="zh-CN" altLang="en-US" smtClean="0"/>
-              <a:t>2021/2/27</a:t>
+              <a:t>2021/3/1</a:t>
             </a:fld>
             <a:endParaRPr lang="zh-CN" altLang="en-US"/>
           </a:p>
@@ -1727,7 +1730,7 @@
           <a:p>
             <a:fld id="{2B65E6A6-E877-45D0-B8F9-A137E1AC6DD2}" type="datetimeFigureOut">
               <a:rPr lang="zh-CN" altLang="en-US" smtClean="0"/>
-              <a:t>2021/2/27</a:t>
+              <a:t>2021/3/1</a:t>
             </a:fld>
             <a:endParaRPr lang="zh-CN" altLang="en-US"/>
           </a:p>
@@ -1822,7 +1825,7 @@
           <a:p>
             <a:fld id="{2B65E6A6-E877-45D0-B8F9-A137E1AC6DD2}" type="datetimeFigureOut">
               <a:rPr lang="zh-CN" altLang="en-US" smtClean="0"/>
-              <a:t>2021/2/27</a:t>
+              <a:t>2021/3/1</a:t>
             </a:fld>
             <a:endParaRPr lang="zh-CN" altLang="en-US"/>
           </a:p>
@@ -2099,7 +2102,7 @@
           <a:p>
             <a:fld id="{2B65E6A6-E877-45D0-B8F9-A137E1AC6DD2}" type="datetimeFigureOut">
               <a:rPr lang="zh-CN" altLang="en-US" smtClean="0"/>
-              <a:t>2021/2/27</a:t>
+              <a:t>2021/3/1</a:t>
             </a:fld>
             <a:endParaRPr lang="zh-CN" altLang="en-US"/>
           </a:p>
@@ -2352,7 +2355,7 @@
           <a:p>
             <a:fld id="{2B65E6A6-E877-45D0-B8F9-A137E1AC6DD2}" type="datetimeFigureOut">
               <a:rPr lang="zh-CN" altLang="en-US" smtClean="0"/>
-              <a:t>2021/2/27</a:t>
+              <a:t>2021/3/1</a:t>
             </a:fld>
             <a:endParaRPr lang="zh-CN" altLang="en-US"/>
           </a:p>
@@ -2565,7 +2568,7 @@
           <a:p>
             <a:fld id="{2B65E6A6-E877-45D0-B8F9-A137E1AC6DD2}" type="datetimeFigureOut">
               <a:rPr lang="zh-CN" altLang="en-US" smtClean="0"/>
-              <a:t>2021/2/27</a:t>
+              <a:t>2021/3/1</a:t>
             </a:fld>
             <a:endParaRPr lang="zh-CN" altLang="en-US"/>
           </a:p>
@@ -3157,7 +3160,7 @@
         <p:spPr>
           <a:xfrm>
             <a:off x="0" y="1"/>
-            <a:ext cx="12192000" cy="5355312"/>
+            <a:ext cx="12192000" cy="1477328"/>
           </a:xfrm>
           <a:prstGeom prst="rect">
             <a:avLst/>
@@ -3172,6 +3175,126 @@
           <a:p>
             <a:r>
               <a:rPr lang="en-US" altLang="zh-CN" dirty="0" smtClean="0"/>
+              <a:t>Viewport</a:t>
+            </a:r>
+            <a:r>
+              <a:rPr lang="zh-CN" altLang="en-US" dirty="0" smtClean="0"/>
+              <a:t>中改</a:t>
+            </a:r>
+            <a:r>
+              <a:rPr lang="en-US" altLang="zh-CN" dirty="0" err="1" smtClean="0"/>
+              <a:t>shader</a:t>
+            </a:r>
+            <a:endParaRPr lang="en-US" altLang="zh-CN" dirty="0" smtClean="0"/>
+          </a:p>
+          <a:p>
+            <a:endParaRPr lang="en-US" altLang="zh-CN" dirty="0"/>
+          </a:p>
+          <a:p>
+            <a:r>
+              <a:rPr lang="en-US" altLang="zh-CN" dirty="0" smtClean="0"/>
+              <a:t>Level</a:t>
+            </a:r>
+            <a:r>
+              <a:rPr lang="zh-CN" altLang="en-US" dirty="0" smtClean="0"/>
+              <a:t>中加载模型</a:t>
+            </a:r>
+            <a:endParaRPr lang="en-US" altLang="zh-CN" dirty="0" smtClean="0"/>
+          </a:p>
+          <a:p>
+            <a:endParaRPr lang="en-US" altLang="zh-CN" dirty="0"/>
+          </a:p>
+          <a:p>
+            <a:r>
+              <a:rPr lang="en-US" altLang="zh-CN" dirty="0" smtClean="0"/>
+              <a:t>Model</a:t>
+            </a:r>
+            <a:r>
+              <a:rPr lang="zh-CN" altLang="en-US" dirty="0" smtClean="0"/>
+              <a:t>和</a:t>
+            </a:r>
+            <a:r>
+              <a:rPr lang="en-US" altLang="zh-CN" dirty="0"/>
+              <a:t>Mesh</a:t>
+            </a:r>
+            <a:r>
+              <a:rPr lang="zh-CN" altLang="en-US" dirty="0" smtClean="0"/>
+              <a:t>中改模型导入细节</a:t>
+            </a:r>
+            <a:r>
+              <a:rPr lang="zh-CN" altLang="en-US" dirty="0"/>
+              <a:t>，</a:t>
+            </a:r>
+            <a:r>
+              <a:rPr lang="zh-CN" altLang="en-US" dirty="0" smtClean="0"/>
+              <a:t>模型数据细节，与</a:t>
+            </a:r>
+            <a:r>
+              <a:rPr lang="en-US" altLang="zh-CN" dirty="0" err="1" smtClean="0"/>
+              <a:t>shader</a:t>
+            </a:r>
+            <a:r>
+              <a:rPr lang="zh-CN" altLang="en-US" dirty="0" smtClean="0"/>
+              <a:t>数据联系起来</a:t>
+            </a:r>
+            <a:endParaRPr lang="en-US" altLang="zh-CN" dirty="0"/>
+          </a:p>
+        </p:txBody>
+      </p:sp>
+    </p:spTree>
+    <p:extLst>
+      <p:ext uri="{BB962C8B-B14F-4D97-AF65-F5344CB8AC3E}">
+        <p14:creationId xmlns:p14="http://schemas.microsoft.com/office/powerpoint/2010/main" val="3795930902"/>
+      </p:ext>
+    </p:extLst>
+  </p:cSld>
+  <p:clrMapOvr>
+    <a:masterClrMapping/>
+  </p:clrMapOvr>
+</p:sld>
+</file>
+
+<file path=ppt/slides/slide3.xml><?xml version="1.0" encoding="utf-8"?>
+<p:sld xmlns:a="http://schemas.openxmlformats.org/drawingml/2006/main" xmlns:r="http://schemas.openxmlformats.org/officeDocument/2006/relationships" xmlns:p="http://schemas.openxmlformats.org/presentationml/2006/main">
+  <p:cSld>
+    <p:spTree>
+      <p:nvGrpSpPr>
+        <p:cNvPr id="1" name=""/>
+        <p:cNvGrpSpPr/>
+        <p:nvPr/>
+      </p:nvGrpSpPr>
+      <p:grpSpPr>
+        <a:xfrm>
+          <a:off x="0" y="0"/>
+          <a:ext cx="0" cy="0"/>
+          <a:chOff x="0" y="0"/>
+          <a:chExt cx="0" cy="0"/>
+        </a:xfrm>
+      </p:grpSpPr>
+      <p:sp>
+        <p:nvSpPr>
+          <p:cNvPr id="4" name="文本框 3"/>
+          <p:cNvSpPr txBox="1"/>
+          <p:nvPr/>
+        </p:nvSpPr>
+        <p:spPr>
+          <a:xfrm>
+            <a:off x="0" y="1"/>
+            <a:ext cx="12192000" cy="7848302"/>
+          </a:xfrm>
+          <a:prstGeom prst="rect">
+            <a:avLst/>
+          </a:prstGeom>
+          <a:noFill/>
+        </p:spPr>
+        <p:txBody>
+          <a:bodyPr wrap="square" rtlCol="0">
+            <a:spAutoFit/>
+          </a:bodyPr>
+          <a:lstStyle/>
+          <a:p>
+            <a:r>
+              <a:rPr lang="en-US" altLang="zh-CN" dirty="0" smtClean="0"/>
               <a:t>//</a:t>
             </a:r>
             <a:r>
@@ -3226,6 +3349,10 @@
           </a:p>
           <a:p>
             <a:r>
+              <a:rPr lang="en-US" altLang="zh-CN" dirty="0" smtClean="0"/>
+              <a:t>//</a:t>
+            </a:r>
+            <a:r>
               <a:rPr lang="zh-CN" altLang="en-US" dirty="0" smtClean="0"/>
               <a:t>看如何导入文件，</a:t>
             </a:r>
@@ -3250,8 +3377,18 @@
               <a:t>quixel</a:t>
             </a:r>
             <a:r>
-              <a:rPr lang="zh-CN" altLang="en-US" smtClean="0"/>
+              <a:rPr lang="zh-CN" altLang="en-US" dirty="0" smtClean="0"/>
               <a:t>能不能导入其他类型的文件</a:t>
+            </a:r>
+            <a:endParaRPr lang="en-US" altLang="zh-CN" dirty="0" smtClean="0"/>
+          </a:p>
+          <a:p>
+            <a:endParaRPr lang="en-US" altLang="zh-CN" dirty="0"/>
+          </a:p>
+          <a:p>
+            <a:r>
+              <a:rPr lang="zh-CN" altLang="en-US" dirty="0" smtClean="0"/>
+              <a:t>自己导入贴图</a:t>
             </a:r>
             <a:endParaRPr lang="en-US" altLang="zh-CN" dirty="0"/>
           </a:p>
@@ -3375,11 +3512,64 @@
             </a:r>
             <a:r>
               <a:rPr lang="zh-CN" altLang="en-US" dirty="0" smtClean="0"/>
-              <a:t>是怎么用的，是否需要自己写。</a:t>
+              <a:t>是怎么用的，是否需要自己写</a:t>
+            </a:r>
+            <a:r>
+              <a:rPr lang="zh-CN" altLang="en-US" dirty="0" smtClean="0"/>
+              <a:t>。</a:t>
             </a:r>
             <a:endParaRPr lang="en-US" altLang="zh-CN" dirty="0" smtClean="0"/>
           </a:p>
           <a:p>
+            <a:endParaRPr lang="en-US" altLang="zh-CN" dirty="0"/>
+          </a:p>
+          <a:p>
+            <a:r>
+              <a:rPr lang="zh-CN" altLang="en-US" dirty="0" smtClean="0"/>
+              <a:t>编写物理模块。</a:t>
+            </a:r>
+            <a:endParaRPr lang="en-US" altLang="zh-CN" dirty="0" smtClean="0"/>
+          </a:p>
+          <a:p>
+            <a:endParaRPr lang="en-US" altLang="zh-CN" dirty="0" smtClean="0"/>
+          </a:p>
+          <a:p>
+            <a:r>
+              <a:rPr lang="zh-CN" altLang="en-US" dirty="0"/>
+              <a:t>导</a:t>
+            </a:r>
+            <a:r>
+              <a:rPr lang="zh-CN" altLang="en-US" dirty="0" smtClean="0"/>
+              <a:t>入人物，让人物在地面上移动。</a:t>
+            </a:r>
+            <a:endParaRPr lang="en-US" altLang="zh-CN" dirty="0" smtClean="0"/>
+          </a:p>
+          <a:p>
+            <a:endParaRPr lang="en-US" altLang="zh-CN" dirty="0"/>
+          </a:p>
+          <a:p>
+            <a:r>
+              <a:rPr lang="zh-CN" altLang="en-US" dirty="0" smtClean="0"/>
+              <a:t>添加动画模块</a:t>
+            </a:r>
+            <a:endParaRPr lang="en-US" altLang="zh-CN" dirty="0" smtClean="0"/>
+          </a:p>
+          <a:p>
+            <a:endParaRPr lang="en-US" altLang="zh-CN" dirty="0"/>
+          </a:p>
+          <a:p>
+            <a:r>
+              <a:rPr lang="zh-CN" altLang="en-US" dirty="0" smtClean="0"/>
+              <a:t>添加</a:t>
+            </a:r>
+            <a:r>
+              <a:rPr lang="en-US" altLang="zh-CN" dirty="0" smtClean="0"/>
+              <a:t>AI</a:t>
+            </a:r>
+            <a:r>
+              <a:rPr lang="zh-CN" altLang="en-US" dirty="0"/>
+              <a:t>模块</a:t>
+            </a:r>
             <a:endParaRPr lang="en-US" altLang="zh-CN" dirty="0"/>
           </a:p>
         </p:txBody>
@@ -3388,6 +3578,550 @@
     <p:extLst>
       <p:ext uri="{BB962C8B-B14F-4D97-AF65-F5344CB8AC3E}">
         <p14:creationId xmlns:p14="http://schemas.microsoft.com/office/powerpoint/2010/main" val="2489203389"/>
+      </p:ext>
+    </p:extLst>
+  </p:cSld>
+  <p:clrMapOvr>
+    <a:masterClrMapping/>
+  </p:clrMapOvr>
+</p:sld>
+</file>
+
+<file path=ppt/slides/slide4.xml><?xml version="1.0" encoding="utf-8"?>
+<p:sld xmlns:a="http://schemas.openxmlformats.org/drawingml/2006/main" xmlns:r="http://schemas.openxmlformats.org/officeDocument/2006/relationships" xmlns:p="http://schemas.openxmlformats.org/presentationml/2006/main">
+  <p:cSld>
+    <p:spTree>
+      <p:nvGrpSpPr>
+        <p:cNvPr id="1" name=""/>
+        <p:cNvGrpSpPr/>
+        <p:nvPr/>
+      </p:nvGrpSpPr>
+      <p:grpSpPr>
+        <a:xfrm>
+          <a:off x="0" y="0"/>
+          <a:ext cx="0" cy="0"/>
+          <a:chOff x="0" y="0"/>
+          <a:chExt cx="0" cy="0"/>
+        </a:xfrm>
+      </p:grpSpPr>
+      <p:sp>
+        <p:nvSpPr>
+          <p:cNvPr id="4" name="文本框 3"/>
+          <p:cNvSpPr txBox="1"/>
+          <p:nvPr/>
+        </p:nvSpPr>
+        <p:spPr>
+          <a:xfrm>
+            <a:off x="0" y="1"/>
+            <a:ext cx="12192000" cy="5632311"/>
+          </a:xfrm>
+          <a:prstGeom prst="rect">
+            <a:avLst/>
+          </a:prstGeom>
+          <a:noFill/>
+        </p:spPr>
+        <p:txBody>
+          <a:bodyPr wrap="square" rtlCol="0">
+            <a:spAutoFit/>
+          </a:bodyPr>
+          <a:lstStyle/>
+          <a:p>
+            <a:r>
+              <a:rPr lang="en-US" altLang="zh-CN" dirty="0" err="1" smtClean="0"/>
+              <a:t>Shader</a:t>
+            </a:r>
+            <a:r>
+              <a:rPr lang="zh-CN" altLang="en-US" dirty="0" smtClean="0"/>
+              <a:t>里输入贴图数据的</a:t>
+            </a:r>
+            <a:r>
+              <a:rPr lang="en-US" altLang="zh-CN" dirty="0" smtClean="0"/>
+              <a:t>location</a:t>
+            </a:r>
+          </a:p>
+          <a:p>
+            <a:endParaRPr lang="en-US" altLang="zh-CN" dirty="0"/>
+          </a:p>
+          <a:p>
+            <a:r>
+              <a:rPr lang="en-US" altLang="zh-CN" dirty="0"/>
+              <a:t> </a:t>
+            </a:r>
+            <a:r>
+              <a:rPr lang="en-US" altLang="zh-CN" dirty="0" smtClean="0"/>
+              <a:t>           // </a:t>
+            </a:r>
+            <a:r>
+              <a:rPr lang="en-US" altLang="zh-CN" dirty="0"/>
+              <a:t>set the vertex attribute pointers</a:t>
+            </a:r>
+          </a:p>
+          <a:p>
+            <a:r>
+              <a:rPr lang="en-US" altLang="zh-CN" dirty="0"/>
+              <a:t>            // vertex Positions</a:t>
+            </a:r>
+          </a:p>
+          <a:p>
+            <a:r>
+              <a:rPr lang="en-US" altLang="zh-CN" dirty="0"/>
+              <a:t>            </a:t>
+            </a:r>
+            <a:r>
+              <a:rPr lang="en-US" altLang="zh-CN" dirty="0" err="1"/>
+              <a:t>glEnableVertexAttribArray</a:t>
+            </a:r>
+            <a:r>
+              <a:rPr lang="en-US" altLang="zh-CN" dirty="0"/>
+              <a:t>(0);</a:t>
+            </a:r>
+          </a:p>
+          <a:p>
+            <a:r>
+              <a:rPr lang="en-US" altLang="zh-CN" dirty="0"/>
+              <a:t>            </a:t>
+            </a:r>
+            <a:r>
+              <a:rPr lang="en-US" altLang="zh-CN" dirty="0" err="1"/>
+              <a:t>glVertexAttribPointer</a:t>
+            </a:r>
+            <a:r>
+              <a:rPr lang="en-US" altLang="zh-CN" dirty="0"/>
+              <a:t>(0, 3, GL_FLOAT, GL_FALSE, </a:t>
+            </a:r>
+            <a:r>
+              <a:rPr lang="en-US" altLang="zh-CN" dirty="0" err="1"/>
+              <a:t>sizeof</a:t>
+            </a:r>
+            <a:r>
+              <a:rPr lang="en-US" altLang="zh-CN" dirty="0"/>
+              <a:t>(Vertex), (void*)0);</a:t>
+            </a:r>
+          </a:p>
+          <a:p>
+            <a:r>
+              <a:rPr lang="en-US" altLang="zh-CN" dirty="0"/>
+              <a:t>            // vertex </a:t>
+            </a:r>
+            <a:r>
+              <a:rPr lang="en-US" altLang="zh-CN" dirty="0" err="1"/>
+              <a:t>normals</a:t>
+            </a:r>
+            <a:endParaRPr lang="en-US" altLang="zh-CN" dirty="0"/>
+          </a:p>
+          <a:p>
+            <a:r>
+              <a:rPr lang="en-US" altLang="zh-CN" dirty="0"/>
+              <a:t>            </a:t>
+            </a:r>
+            <a:r>
+              <a:rPr lang="en-US" altLang="zh-CN" dirty="0" err="1"/>
+              <a:t>glEnableVertexAttribArray</a:t>
+            </a:r>
+            <a:r>
+              <a:rPr lang="en-US" altLang="zh-CN" dirty="0"/>
+              <a:t>(1);</a:t>
+            </a:r>
+          </a:p>
+          <a:p>
+            <a:r>
+              <a:rPr lang="en-US" altLang="zh-CN" dirty="0"/>
+              <a:t>            </a:t>
+            </a:r>
+            <a:r>
+              <a:rPr lang="en-US" altLang="zh-CN" dirty="0" err="1"/>
+              <a:t>glVertexAttribPointer</a:t>
+            </a:r>
+            <a:r>
+              <a:rPr lang="en-US" altLang="zh-CN" dirty="0"/>
+              <a:t>(1, 3, GL_FLOAT, GL_FALSE, </a:t>
+            </a:r>
+            <a:r>
+              <a:rPr lang="en-US" altLang="zh-CN" dirty="0" err="1"/>
+              <a:t>sizeof</a:t>
+            </a:r>
+            <a:r>
+              <a:rPr lang="en-US" altLang="zh-CN" dirty="0"/>
+              <a:t>(Vertex), (void*)</a:t>
+            </a:r>
+            <a:r>
+              <a:rPr lang="en-US" altLang="zh-CN" dirty="0" err="1"/>
+              <a:t>offsetof</a:t>
+            </a:r>
+            <a:r>
+              <a:rPr lang="en-US" altLang="zh-CN" dirty="0"/>
+              <a:t>(Vertex, Normal));</a:t>
+            </a:r>
+          </a:p>
+          <a:p>
+            <a:r>
+              <a:rPr lang="en-US" altLang="zh-CN" dirty="0"/>
+              <a:t>            // vertex texture </a:t>
+            </a:r>
+            <a:r>
+              <a:rPr lang="en-US" altLang="zh-CN" dirty="0" err="1"/>
+              <a:t>coords</a:t>
+            </a:r>
+            <a:endParaRPr lang="en-US" altLang="zh-CN" dirty="0"/>
+          </a:p>
+          <a:p>
+            <a:r>
+              <a:rPr lang="en-US" altLang="zh-CN" dirty="0"/>
+              <a:t>            </a:t>
+            </a:r>
+            <a:r>
+              <a:rPr lang="en-US" altLang="zh-CN" dirty="0" err="1"/>
+              <a:t>glEnableVertexAttribArray</a:t>
+            </a:r>
+            <a:r>
+              <a:rPr lang="en-US" altLang="zh-CN" dirty="0"/>
+              <a:t>(2);</a:t>
+            </a:r>
+          </a:p>
+          <a:p>
+            <a:r>
+              <a:rPr lang="en-US" altLang="zh-CN" dirty="0"/>
+              <a:t>            </a:t>
+            </a:r>
+            <a:r>
+              <a:rPr lang="en-US" altLang="zh-CN" dirty="0" err="1"/>
+              <a:t>glVertexAttribPointer</a:t>
+            </a:r>
+            <a:r>
+              <a:rPr lang="en-US" altLang="zh-CN" dirty="0"/>
+              <a:t>(2, 2, GL_FLOAT, GL_FALSE, </a:t>
+            </a:r>
+            <a:r>
+              <a:rPr lang="en-US" altLang="zh-CN" dirty="0" err="1"/>
+              <a:t>sizeof</a:t>
+            </a:r>
+            <a:r>
+              <a:rPr lang="en-US" altLang="zh-CN" dirty="0"/>
+              <a:t>(Vertex), (void*)</a:t>
+            </a:r>
+            <a:r>
+              <a:rPr lang="en-US" altLang="zh-CN" dirty="0" err="1"/>
+              <a:t>offsetof</a:t>
+            </a:r>
+            <a:r>
+              <a:rPr lang="en-US" altLang="zh-CN" dirty="0"/>
+              <a:t>(Vertex, </a:t>
+            </a:r>
+            <a:r>
+              <a:rPr lang="en-US" altLang="zh-CN" dirty="0" err="1"/>
+              <a:t>TexCoords</a:t>
+            </a:r>
+            <a:r>
+              <a:rPr lang="en-US" altLang="zh-CN" dirty="0"/>
+              <a:t>));</a:t>
+            </a:r>
+          </a:p>
+          <a:p>
+            <a:r>
+              <a:rPr lang="en-US" altLang="zh-CN" dirty="0"/>
+              <a:t>            // vertex tangent</a:t>
+            </a:r>
+          </a:p>
+          <a:p>
+            <a:r>
+              <a:rPr lang="en-US" altLang="zh-CN" dirty="0"/>
+              <a:t>            </a:t>
+            </a:r>
+            <a:r>
+              <a:rPr lang="en-US" altLang="zh-CN" dirty="0" err="1"/>
+              <a:t>glEnableVertexAttribArray</a:t>
+            </a:r>
+            <a:r>
+              <a:rPr lang="en-US" altLang="zh-CN" dirty="0"/>
+              <a:t>(3);</a:t>
+            </a:r>
+          </a:p>
+          <a:p>
+            <a:r>
+              <a:rPr lang="en-US" altLang="zh-CN" dirty="0"/>
+              <a:t>            </a:t>
+            </a:r>
+            <a:r>
+              <a:rPr lang="en-US" altLang="zh-CN" dirty="0" err="1"/>
+              <a:t>glVertexAttribPointer</a:t>
+            </a:r>
+            <a:r>
+              <a:rPr lang="en-US" altLang="zh-CN" dirty="0"/>
+              <a:t>(3, 3, GL_FLOAT, GL_FALSE, </a:t>
+            </a:r>
+            <a:r>
+              <a:rPr lang="en-US" altLang="zh-CN" dirty="0" err="1"/>
+              <a:t>sizeof</a:t>
+            </a:r>
+            <a:r>
+              <a:rPr lang="en-US" altLang="zh-CN" dirty="0"/>
+              <a:t>(Vertex), (void*)</a:t>
+            </a:r>
+            <a:r>
+              <a:rPr lang="en-US" altLang="zh-CN" dirty="0" err="1"/>
+              <a:t>offsetof</a:t>
+            </a:r>
+            <a:r>
+              <a:rPr lang="en-US" altLang="zh-CN" dirty="0"/>
+              <a:t>(Vertex, Tangent));</a:t>
+            </a:r>
+          </a:p>
+          <a:p>
+            <a:r>
+              <a:rPr lang="en-US" altLang="zh-CN" dirty="0"/>
+              <a:t>            // vertex </a:t>
+            </a:r>
+            <a:r>
+              <a:rPr lang="en-US" altLang="zh-CN" dirty="0" err="1"/>
+              <a:t>bitangent</a:t>
+            </a:r>
+            <a:endParaRPr lang="en-US" altLang="zh-CN" dirty="0"/>
+          </a:p>
+          <a:p>
+            <a:r>
+              <a:rPr lang="en-US" altLang="zh-CN" dirty="0"/>
+              <a:t>            </a:t>
+            </a:r>
+            <a:r>
+              <a:rPr lang="en-US" altLang="zh-CN" dirty="0" err="1"/>
+              <a:t>glEnableVertexAttribArray</a:t>
+            </a:r>
+            <a:r>
+              <a:rPr lang="en-US" altLang="zh-CN" dirty="0"/>
+              <a:t>(4);</a:t>
+            </a:r>
+          </a:p>
+          <a:p>
+            <a:r>
+              <a:rPr lang="en-US" altLang="zh-CN" dirty="0"/>
+              <a:t>            </a:t>
+            </a:r>
+            <a:r>
+              <a:rPr lang="en-US" altLang="zh-CN" dirty="0" err="1"/>
+              <a:t>glVertexAttribPointer</a:t>
+            </a:r>
+            <a:r>
+              <a:rPr lang="en-US" altLang="zh-CN" dirty="0"/>
+              <a:t>(4, 3, GL_FLOAT, GL_FALSE, </a:t>
+            </a:r>
+            <a:r>
+              <a:rPr lang="en-US" altLang="zh-CN" dirty="0" err="1"/>
+              <a:t>sizeof</a:t>
+            </a:r>
+            <a:r>
+              <a:rPr lang="en-US" altLang="zh-CN" dirty="0"/>
+              <a:t>(Vertex), (void*)</a:t>
+            </a:r>
+            <a:r>
+              <a:rPr lang="en-US" altLang="zh-CN" dirty="0" err="1"/>
+              <a:t>offsetof</a:t>
+            </a:r>
+            <a:r>
+              <a:rPr lang="en-US" altLang="zh-CN" dirty="0"/>
+              <a:t>(Vertex, </a:t>
+            </a:r>
+            <a:r>
+              <a:rPr lang="en-US" altLang="zh-CN" dirty="0" err="1"/>
+              <a:t>Bitangent</a:t>
+            </a:r>
+            <a:r>
+              <a:rPr lang="en-US" altLang="zh-CN" dirty="0"/>
+              <a:t>));</a:t>
+            </a:r>
+            <a:endParaRPr lang="en-US" altLang="zh-CN" dirty="0" smtClean="0"/>
+          </a:p>
+          <a:p>
+            <a:endParaRPr lang="en-US" altLang="zh-CN" dirty="0"/>
+          </a:p>
+          <a:p>
+            <a:endParaRPr lang="en-US" altLang="zh-CN" dirty="0"/>
+          </a:p>
+        </p:txBody>
+      </p:sp>
+    </p:spTree>
+    <p:extLst>
+      <p:ext uri="{BB962C8B-B14F-4D97-AF65-F5344CB8AC3E}">
+        <p14:creationId xmlns:p14="http://schemas.microsoft.com/office/powerpoint/2010/main" val="467470813"/>
+      </p:ext>
+    </p:extLst>
+  </p:cSld>
+  <p:clrMapOvr>
+    <a:masterClrMapping/>
+  </p:clrMapOvr>
+</p:sld>
+</file>
+
+<file path=ppt/slides/slide5.xml><?xml version="1.0" encoding="utf-8"?>
+<p:sld xmlns:a="http://schemas.openxmlformats.org/drawingml/2006/main" xmlns:r="http://schemas.openxmlformats.org/officeDocument/2006/relationships" xmlns:p="http://schemas.openxmlformats.org/presentationml/2006/main">
+  <p:cSld>
+    <p:spTree>
+      <p:nvGrpSpPr>
+        <p:cNvPr id="1" name=""/>
+        <p:cNvGrpSpPr/>
+        <p:nvPr/>
+      </p:nvGrpSpPr>
+      <p:grpSpPr>
+        <a:xfrm>
+          <a:off x="0" y="0"/>
+          <a:ext cx="0" cy="0"/>
+          <a:chOff x="0" y="0"/>
+          <a:chExt cx="0" cy="0"/>
+        </a:xfrm>
+      </p:grpSpPr>
+      <p:sp>
+        <p:nvSpPr>
+          <p:cNvPr id="4" name="文本框 3"/>
+          <p:cNvSpPr txBox="1"/>
+          <p:nvPr/>
+        </p:nvSpPr>
+        <p:spPr>
+          <a:xfrm>
+            <a:off x="0" y="1"/>
+            <a:ext cx="12192000" cy="2308324"/>
+          </a:xfrm>
+          <a:prstGeom prst="rect">
+            <a:avLst/>
+          </a:prstGeom>
+          <a:noFill/>
+        </p:spPr>
+        <p:txBody>
+          <a:bodyPr wrap="square" rtlCol="0">
+            <a:spAutoFit/>
+          </a:bodyPr>
+          <a:lstStyle/>
+          <a:p>
+            <a:r>
+              <a:rPr lang="en-US" altLang="zh-CN" dirty="0"/>
+              <a:t>//</a:t>
+            </a:r>
+            <a:r>
+              <a:rPr lang="en-US" altLang="zh-CN" dirty="0" err="1"/>
+              <a:t>const</a:t>
+            </a:r>
+            <a:r>
+              <a:rPr lang="en-US" altLang="zh-CN" dirty="0"/>
+              <a:t> </a:t>
+            </a:r>
+            <a:r>
+              <a:rPr lang="en-US" altLang="zh-CN" dirty="0" err="1"/>
+              <a:t>aiScene</a:t>
+            </a:r>
+            <a:r>
+              <a:rPr lang="en-US" altLang="zh-CN" dirty="0"/>
+              <a:t>* scene = </a:t>
+            </a:r>
+            <a:r>
+              <a:rPr lang="en-US" altLang="zh-CN" dirty="0" err="1"/>
+              <a:t>importer.ReadFile</a:t>
+            </a:r>
+            <a:r>
+              <a:rPr lang="en-US" altLang="zh-CN" dirty="0"/>
+              <a:t>(path, </a:t>
+            </a:r>
+            <a:r>
+              <a:rPr lang="en-US" altLang="zh-CN" dirty="0" err="1"/>
+              <a:t>aiProcess_Triangulate</a:t>
+            </a:r>
+            <a:r>
+              <a:rPr lang="en-US" altLang="zh-CN" dirty="0"/>
+              <a:t> | </a:t>
+            </a:r>
+            <a:r>
+              <a:rPr lang="en-US" altLang="zh-CN" dirty="0" err="1"/>
+              <a:t>aiProcess_GenSmoothNormals</a:t>
+            </a:r>
+            <a:r>
+              <a:rPr lang="en-US" altLang="zh-CN" dirty="0"/>
+              <a:t> | </a:t>
+            </a:r>
+            <a:r>
+              <a:rPr lang="en-US" altLang="zh-CN" dirty="0" err="1"/>
+              <a:t>aiProcess_FlipUVs</a:t>
+            </a:r>
+            <a:r>
+              <a:rPr lang="en-US" altLang="zh-CN" dirty="0"/>
+              <a:t> | </a:t>
+            </a:r>
+            <a:r>
+              <a:rPr lang="en-US" altLang="zh-CN" dirty="0" err="1"/>
+              <a:t>aiProcess_CalcTangentSpace</a:t>
+            </a:r>
+            <a:r>
+              <a:rPr lang="en-US" altLang="zh-CN" dirty="0"/>
+              <a:t>);</a:t>
+            </a:r>
+          </a:p>
+          <a:p>
+            <a:r>
+              <a:rPr lang="en-US" altLang="zh-CN" dirty="0"/>
+              <a:t>   </a:t>
+            </a:r>
+            <a:endParaRPr lang="en-US" altLang="zh-CN" dirty="0" smtClean="0"/>
+          </a:p>
+          <a:p>
+            <a:r>
+              <a:rPr lang="en-US" altLang="zh-CN" dirty="0" err="1" smtClean="0"/>
+              <a:t>const</a:t>
+            </a:r>
+            <a:r>
+              <a:rPr lang="en-US" altLang="zh-CN" dirty="0" smtClean="0"/>
+              <a:t> </a:t>
+            </a:r>
+            <a:r>
+              <a:rPr lang="en-US" altLang="zh-CN" dirty="0" err="1"/>
+              <a:t>aiScene</a:t>
+            </a:r>
+            <a:r>
+              <a:rPr lang="en-US" altLang="zh-CN" dirty="0"/>
+              <a:t>* scene = </a:t>
+            </a:r>
+            <a:r>
+              <a:rPr lang="en-US" altLang="zh-CN" dirty="0" err="1"/>
+              <a:t>importer.ReadFile</a:t>
+            </a:r>
+            <a:r>
+              <a:rPr lang="en-US" altLang="zh-CN" dirty="0"/>
+              <a:t>(path, 0);</a:t>
+            </a:r>
+          </a:p>
+          <a:p>
+            <a:r>
+              <a:rPr lang="zh-CN" altLang="en-US" dirty="0"/>
+              <a:t> </a:t>
+            </a:r>
+            <a:endParaRPr lang="en-US" altLang="zh-CN" dirty="0" smtClean="0"/>
+          </a:p>
+          <a:p>
+            <a:r>
+              <a:rPr lang="zh-CN" altLang="en-US" dirty="0" smtClean="0"/>
+              <a:t>把上一句注释掉，换成下一句之后，</a:t>
+            </a:r>
+            <a:r>
+              <a:rPr lang="en-US" altLang="zh-CN" dirty="0" err="1" smtClean="0"/>
+              <a:t>Quixel</a:t>
+            </a:r>
+            <a:r>
+              <a:rPr lang="zh-CN" altLang="en-US" dirty="0" smtClean="0"/>
+              <a:t>的模型能正常显示了。</a:t>
+            </a:r>
+            <a:endParaRPr lang="en-US" altLang="zh-CN" dirty="0" smtClean="0"/>
+          </a:p>
+          <a:p>
+            <a:endParaRPr lang="en-US" altLang="zh-CN" dirty="0"/>
+          </a:p>
+          <a:p>
+            <a:r>
+              <a:rPr lang="zh-CN" altLang="en-US" dirty="0" smtClean="0"/>
+              <a:t>所以这里很关键，要注意。</a:t>
+            </a:r>
+            <a:endParaRPr lang="en-US" altLang="zh-CN" dirty="0"/>
+          </a:p>
+        </p:txBody>
+      </p:sp>
+    </p:spTree>
+    <p:extLst>
+      <p:ext uri="{BB962C8B-B14F-4D97-AF65-F5344CB8AC3E}">
+        <p14:creationId xmlns:p14="http://schemas.microsoft.com/office/powerpoint/2010/main" val="3055022421"/>
       </p:ext>
     </p:extLst>
   </p:cSld>

</xml_diff>

<commit_message>
now can generate the heightmap of the landscape
</commit_message>
<xml_diff>
--- a/未来修改.pptx
+++ b/未来修改.pptx
@@ -5,11 +5,12 @@
     <p:sldMasterId id="2147483648" r:id="rId1"/>
   </p:sldMasterIdLst>
   <p:sldIdLst>
-    <p:sldId id="256" r:id="rId2"/>
-    <p:sldId id="260" r:id="rId3"/>
-    <p:sldId id="257" r:id="rId4"/>
+    <p:sldId id="257" r:id="rId2"/>
+    <p:sldId id="256" r:id="rId3"/>
+    <p:sldId id="260" r:id="rId4"/>
     <p:sldId id="258" r:id="rId5"/>
     <p:sldId id="259" r:id="rId6"/>
+    <p:sldId id="261" r:id="rId7"/>
   </p:sldIdLst>
   <p:sldSz cx="12192000" cy="6858000"/>
   <p:notesSz cx="6858000" cy="9144000"/>
@@ -247,7 +248,7 @@
           <a:p>
             <a:fld id="{2B65E6A6-E877-45D0-B8F9-A137E1AC6DD2}" type="datetimeFigureOut">
               <a:rPr lang="zh-CN" altLang="en-US" smtClean="0"/>
-              <a:t>2021/3/1</a:t>
+              <a:t>2021/3/3</a:t>
             </a:fld>
             <a:endParaRPr lang="zh-CN" altLang="en-US"/>
           </a:p>
@@ -417,7 +418,7 @@
           <a:p>
             <a:fld id="{2B65E6A6-E877-45D0-B8F9-A137E1AC6DD2}" type="datetimeFigureOut">
               <a:rPr lang="zh-CN" altLang="en-US" smtClean="0"/>
-              <a:t>2021/3/1</a:t>
+              <a:t>2021/3/3</a:t>
             </a:fld>
             <a:endParaRPr lang="zh-CN" altLang="en-US"/>
           </a:p>
@@ -597,7 +598,7 @@
           <a:p>
             <a:fld id="{2B65E6A6-E877-45D0-B8F9-A137E1AC6DD2}" type="datetimeFigureOut">
               <a:rPr lang="zh-CN" altLang="en-US" smtClean="0"/>
-              <a:t>2021/3/1</a:t>
+              <a:t>2021/3/3</a:t>
             </a:fld>
             <a:endParaRPr lang="zh-CN" altLang="en-US"/>
           </a:p>
@@ -767,7 +768,7 @@
           <a:p>
             <a:fld id="{2B65E6A6-E877-45D0-B8F9-A137E1AC6DD2}" type="datetimeFigureOut">
               <a:rPr lang="zh-CN" altLang="en-US" smtClean="0"/>
-              <a:t>2021/3/1</a:t>
+              <a:t>2021/3/3</a:t>
             </a:fld>
             <a:endParaRPr lang="zh-CN" altLang="en-US"/>
           </a:p>
@@ -1013,7 +1014,7 @@
           <a:p>
             <a:fld id="{2B65E6A6-E877-45D0-B8F9-A137E1AC6DD2}" type="datetimeFigureOut">
               <a:rPr lang="zh-CN" altLang="en-US" smtClean="0"/>
-              <a:t>2021/3/1</a:t>
+              <a:t>2021/3/3</a:t>
             </a:fld>
             <a:endParaRPr lang="zh-CN" altLang="en-US"/>
           </a:p>
@@ -1245,7 +1246,7 @@
           <a:p>
             <a:fld id="{2B65E6A6-E877-45D0-B8F9-A137E1AC6DD2}" type="datetimeFigureOut">
               <a:rPr lang="zh-CN" altLang="en-US" smtClean="0"/>
-              <a:t>2021/3/1</a:t>
+              <a:t>2021/3/3</a:t>
             </a:fld>
             <a:endParaRPr lang="zh-CN" altLang="en-US"/>
           </a:p>
@@ -1612,7 +1613,7 @@
           <a:p>
             <a:fld id="{2B65E6A6-E877-45D0-B8F9-A137E1AC6DD2}" type="datetimeFigureOut">
               <a:rPr lang="zh-CN" altLang="en-US" smtClean="0"/>
-              <a:t>2021/3/1</a:t>
+              <a:t>2021/3/3</a:t>
             </a:fld>
             <a:endParaRPr lang="zh-CN" altLang="en-US"/>
           </a:p>
@@ -1730,7 +1731,7 @@
           <a:p>
             <a:fld id="{2B65E6A6-E877-45D0-B8F9-A137E1AC6DD2}" type="datetimeFigureOut">
               <a:rPr lang="zh-CN" altLang="en-US" smtClean="0"/>
-              <a:t>2021/3/1</a:t>
+              <a:t>2021/3/3</a:t>
             </a:fld>
             <a:endParaRPr lang="zh-CN" altLang="en-US"/>
           </a:p>
@@ -1825,7 +1826,7 @@
           <a:p>
             <a:fld id="{2B65E6A6-E877-45D0-B8F9-A137E1AC6DD2}" type="datetimeFigureOut">
               <a:rPr lang="zh-CN" altLang="en-US" smtClean="0"/>
-              <a:t>2021/3/1</a:t>
+              <a:t>2021/3/3</a:t>
             </a:fld>
             <a:endParaRPr lang="zh-CN" altLang="en-US"/>
           </a:p>
@@ -2102,7 +2103,7 @@
           <a:p>
             <a:fld id="{2B65E6A6-E877-45D0-B8F9-A137E1AC6DD2}" type="datetimeFigureOut">
               <a:rPr lang="zh-CN" altLang="en-US" smtClean="0"/>
-              <a:t>2021/3/1</a:t>
+              <a:t>2021/3/3</a:t>
             </a:fld>
             <a:endParaRPr lang="zh-CN" altLang="en-US"/>
           </a:p>
@@ -2355,7 +2356,7 @@
           <a:p>
             <a:fld id="{2B65E6A6-E877-45D0-B8F9-A137E1AC6DD2}" type="datetimeFigureOut">
               <a:rPr lang="zh-CN" altLang="en-US" smtClean="0"/>
-              <a:t>2021/3/1</a:t>
+              <a:t>2021/3/3</a:t>
             </a:fld>
             <a:endParaRPr lang="zh-CN" altLang="en-US"/>
           </a:p>
@@ -2568,7 +2569,7 @@
           <a:p>
             <a:fld id="{2B65E6A6-E877-45D0-B8F9-A137E1AC6DD2}" type="datetimeFigureOut">
               <a:rPr lang="zh-CN" altLang="en-US" smtClean="0"/>
-              <a:t>2021/3/1</a:t>
+              <a:t>2021/3/3</a:t>
             </a:fld>
             <a:endParaRPr lang="zh-CN" altLang="en-US"/>
           </a:p>
@@ -2981,8 +2982,8 @@
         </p:nvSpPr>
         <p:spPr>
           <a:xfrm>
-            <a:off x="0" y="0"/>
-            <a:ext cx="12192000" cy="2862322"/>
+            <a:off x="0" y="1"/>
+            <a:ext cx="12192000" cy="8679299"/>
           </a:xfrm>
           <a:prstGeom prst="rect">
             <a:avLst/>
@@ -2995,31 +2996,50 @@
           </a:bodyPr>
           <a:lstStyle/>
           <a:p>
+            <a:r>
+              <a:rPr lang="zh-CN" altLang="en-US" dirty="0" smtClean="0"/>
+              <a:t>接下来的任务</a:t>
+            </a:r>
             <a:endParaRPr lang="en-US" altLang="zh-CN" dirty="0" smtClean="0"/>
           </a:p>
           <a:p>
+            <a:endParaRPr lang="en-US" altLang="zh-CN" dirty="0"/>
+          </a:p>
+          <a:p>
             <a:r>
               <a:rPr lang="en-US" altLang="zh-CN" dirty="0" smtClean="0"/>
-              <a:t>Layer </a:t>
-            </a:r>
-            <a:r>
-              <a:rPr lang="zh-CN" altLang="en-US" dirty="0" smtClean="0"/>
-              <a:t>拥有这一层的控制</a:t>
+              <a:t>//</a:t>
+            </a:r>
+            <a:r>
+              <a:rPr lang="en-US" altLang="zh-CN" dirty="0" err="1" smtClean="0"/>
+              <a:t>Key_repeate</a:t>
+            </a:r>
+            <a:r>
+              <a:rPr lang="zh-CN" altLang="en-US" dirty="0" smtClean="0"/>
+              <a:t>的速度只有帧率的</a:t>
+            </a:r>
+            <a:r>
+              <a:rPr lang="en-US" altLang="zh-CN" dirty="0" smtClean="0"/>
+              <a:t>1/3</a:t>
+            </a:r>
+            <a:r>
+              <a:rPr lang="zh-CN" altLang="en-US" dirty="0" smtClean="0"/>
+              <a:t>，移动时不够流畅，需要修改。</a:t>
             </a:r>
             <a:endParaRPr lang="en-US" altLang="zh-CN" dirty="0" smtClean="0"/>
           </a:p>
           <a:p>
             <a:r>
               <a:rPr lang="zh-CN" altLang="en-US" dirty="0" smtClean="0"/>
-              <a:t>非</a:t>
+              <a:t>添加响应鼠标按键、响应</a:t>
             </a:r>
             <a:r>
               <a:rPr lang="en-US" altLang="zh-CN" dirty="0" smtClean="0"/>
-              <a:t>layer</a:t>
-            </a:r>
-            <a:r>
-              <a:rPr lang="zh-CN" altLang="en-US" dirty="0" smtClean="0"/>
-              <a:t>拥有这一层的实体和功能实现</a:t>
+              <a:t>Mod</a:t>
+            </a:r>
+            <a:r>
+              <a:rPr lang="zh-CN" altLang="en-US" dirty="0" smtClean="0"/>
+              <a:t>切换功能。</a:t>
             </a:r>
             <a:endParaRPr lang="en-US" altLang="zh-CN" dirty="0" smtClean="0"/>
           </a:p>
@@ -3028,38 +3048,75 @@
           </a:p>
           <a:p>
             <a:r>
-              <a:rPr lang="zh-CN" altLang="en-US" dirty="0" smtClean="0"/>
-              <a:t>相当于</a:t>
-            </a:r>
-            <a:r>
               <a:rPr lang="en-US" altLang="zh-CN" dirty="0" smtClean="0"/>
-              <a:t>layer</a:t>
-            </a:r>
-            <a:r>
-              <a:rPr lang="zh-CN" altLang="en-US" dirty="0" smtClean="0"/>
-              <a:t>是这一层的</a:t>
-            </a:r>
+              <a:t>//Camera</a:t>
+            </a:r>
+            <a:r>
+              <a:rPr lang="zh-CN" altLang="en-US" dirty="0" smtClean="0"/>
+              <a:t>只能在平面移动，需要添加自由移动。</a:t>
+            </a:r>
+            <a:endParaRPr lang="en-US" altLang="zh-CN" dirty="0" smtClean="0"/>
+          </a:p>
+          <a:p>
             <a:r>
               <a:rPr lang="en-US" altLang="zh-CN" dirty="0" smtClean="0"/>
-              <a:t>public</a:t>
-            </a:r>
-          </a:p>
-          <a:p>
-            <a:r>
-              <a:rPr lang="zh-CN" altLang="en-US" dirty="0" smtClean="0"/>
-              <a:t>非</a:t>
-            </a:r>
+              <a:t>Camera</a:t>
+            </a:r>
+            <a:r>
+              <a:rPr lang="zh-CN" altLang="en-US" dirty="0" smtClean="0"/>
+              <a:t>偏转改为四元数。</a:t>
+            </a:r>
+            <a:endParaRPr lang="en-US" altLang="zh-CN" dirty="0" smtClean="0"/>
+          </a:p>
+          <a:p>
+            <a:endParaRPr lang="en-US" altLang="zh-CN" dirty="0" smtClean="0"/>
+          </a:p>
+          <a:p>
             <a:r>
               <a:rPr lang="en-US" altLang="zh-CN" dirty="0" smtClean="0"/>
-              <a:t>layer</a:t>
-            </a:r>
-            <a:r>
-              <a:rPr lang="zh-CN" altLang="en-US" dirty="0" smtClean="0"/>
-              <a:t>是这一层的</a:t>
-            </a:r>
+              <a:t>//</a:t>
+            </a:r>
+            <a:r>
+              <a:rPr lang="zh-CN" altLang="en-US" dirty="0" smtClean="0"/>
+              <a:t>看如何导入文件，</a:t>
+            </a:r>
+            <a:r>
+              <a:rPr lang="en-US" altLang="zh-CN" dirty="0" err="1" smtClean="0"/>
+              <a:t>assimp</a:t>
+            </a:r>
+            <a:r>
+              <a:rPr lang="zh-CN" altLang="en-US" dirty="0" smtClean="0"/>
+              <a:t>不能导入</a:t>
+            </a:r>
+            <a:r>
+              <a:rPr lang="en-US" altLang="zh-CN" dirty="0" err="1" smtClean="0"/>
+              <a:t>json</a:t>
+            </a:r>
+            <a:r>
+              <a:rPr lang="zh-CN" altLang="en-US" dirty="0" smtClean="0"/>
+              <a:t>文件，看</a:t>
+            </a:r>
+            <a:r>
+              <a:rPr lang="en-US" altLang="zh-CN" dirty="0" err="1" smtClean="0"/>
+              <a:t>quixel</a:t>
+            </a:r>
+            <a:r>
+              <a:rPr lang="zh-CN" altLang="en-US" dirty="0" smtClean="0"/>
+              <a:t>能不能导入其他类型的文件</a:t>
+            </a:r>
+            <a:endParaRPr lang="en-US" altLang="zh-CN" dirty="0" smtClean="0"/>
+          </a:p>
+          <a:p>
+            <a:endParaRPr lang="en-US" altLang="zh-CN" dirty="0"/>
+          </a:p>
+          <a:p>
             <a:r>
               <a:rPr lang="en-US" altLang="zh-CN" dirty="0" smtClean="0"/>
-              <a:t>private</a:t>
+              <a:t>//</a:t>
+            </a:r>
+            <a:r>
+              <a:rPr lang="zh-CN" altLang="en-US" dirty="0" smtClean="0"/>
+              <a:t>自己导入贴图</a:t>
             </a:r>
             <a:endParaRPr lang="en-US" altLang="zh-CN" dirty="0"/>
           </a:p>
@@ -3068,24 +3125,150 @@
           </a:p>
           <a:p>
             <a:r>
+              <a:rPr lang="zh-CN" altLang="en-US" dirty="0" smtClean="0"/>
+              <a:t>阅读</a:t>
+            </a:r>
+            <a:r>
               <a:rPr lang="en-US" altLang="zh-CN" dirty="0" smtClean="0"/>
-              <a:t>Event</a:t>
-            </a:r>
-            <a:r>
-              <a:rPr lang="zh-CN" altLang="en-US" dirty="0" smtClean="0"/>
-              <a:t>在每一层中穿过，给每一层</a:t>
-            </a:r>
+              <a:t>PBR </a:t>
+            </a:r>
+            <a:r>
+              <a:rPr lang="zh-CN" altLang="en-US" dirty="0" smtClean="0"/>
+              <a:t>的</a:t>
+            </a:r>
+            <a:r>
+              <a:rPr lang="en-US" altLang="zh-CN" dirty="0" err="1" smtClean="0"/>
+              <a:t>shader</a:t>
+            </a:r>
+            <a:r>
+              <a:rPr lang="zh-CN" altLang="en-US" dirty="0" smtClean="0"/>
+              <a:t>文件。加入置换贴图。</a:t>
+            </a:r>
+            <a:endParaRPr lang="en-US" altLang="zh-CN" dirty="0" smtClean="0"/>
+          </a:p>
+          <a:p>
+            <a:endParaRPr lang="en-US" altLang="zh-CN" dirty="0"/>
+          </a:p>
+          <a:p>
             <a:r>
               <a:rPr lang="en-US" altLang="zh-CN" dirty="0" smtClean="0"/>
-              <a:t>layer</a:t>
-            </a:r>
+              <a:t>//</a:t>
+            </a:r>
+            <a:r>
+              <a:rPr lang="zh-CN" altLang="en-US" dirty="0" smtClean="0"/>
+              <a:t>看</a:t>
+            </a:r>
+            <a:r>
+              <a:rPr lang="en-US" altLang="zh-CN" dirty="0" err="1" smtClean="0"/>
+              <a:t>quixel</a:t>
+            </a:r>
+            <a:r>
+              <a:rPr lang="zh-CN" altLang="en-US" dirty="0" smtClean="0"/>
+              <a:t>的文件与这个</a:t>
+            </a:r>
+            <a:r>
+              <a:rPr lang="en-US" altLang="zh-CN" dirty="0" err="1" smtClean="0"/>
+              <a:t>shader</a:t>
+            </a:r>
+            <a:r>
+              <a:rPr lang="zh-CN" altLang="en-US" dirty="0" smtClean="0"/>
+              <a:t>合不合适。</a:t>
+            </a:r>
+            <a:endParaRPr lang="en-US" altLang="zh-CN" dirty="0" smtClean="0"/>
+          </a:p>
+          <a:p>
+            <a:endParaRPr lang="en-US" altLang="zh-CN" dirty="0"/>
+          </a:p>
+          <a:p>
+            <a:r>
+              <a:rPr lang="zh-CN" altLang="en-US" dirty="0" smtClean="0"/>
+              <a:t>添加高度图和物体位置生成。</a:t>
+            </a:r>
+            <a:endParaRPr lang="en-US" altLang="zh-CN" dirty="0" smtClean="0"/>
+          </a:p>
+          <a:p>
+            <a:endParaRPr lang="en-US" altLang="zh-CN" dirty="0"/>
+          </a:p>
+          <a:p>
+            <a:r>
+              <a:rPr lang="zh-CN" altLang="en-US" dirty="0" smtClean="0"/>
+              <a:t>添加二次元渲染</a:t>
+            </a:r>
+            <a:r>
+              <a:rPr lang="en-US" altLang="zh-CN" dirty="0" err="1" smtClean="0"/>
+              <a:t>shader</a:t>
+            </a:r>
+            <a:r>
+              <a:rPr lang="zh-CN" altLang="en-US" dirty="0" smtClean="0"/>
+              <a:t>。</a:t>
+            </a:r>
+            <a:endParaRPr lang="en-US" altLang="zh-CN" dirty="0" smtClean="0"/>
+          </a:p>
+          <a:p>
+            <a:endParaRPr lang="en-US" altLang="zh-CN" dirty="0"/>
+          </a:p>
+          <a:p>
+            <a:r>
+              <a:rPr lang="zh-CN" altLang="en-US" dirty="0" smtClean="0"/>
+              <a:t>研究</a:t>
+            </a:r>
+            <a:r>
+              <a:rPr lang="en-US" altLang="zh-CN" dirty="0" smtClean="0"/>
+              <a:t>AA</a:t>
+            </a:r>
+            <a:r>
+              <a:rPr lang="zh-CN" altLang="en-US" dirty="0" smtClean="0"/>
+              <a:t>在</a:t>
+            </a:r>
+            <a:r>
+              <a:rPr lang="en-US" altLang="zh-CN" dirty="0" err="1" smtClean="0"/>
+              <a:t>opengl</a:t>
+            </a:r>
+            <a:r>
+              <a:rPr lang="zh-CN" altLang="en-US" dirty="0" smtClean="0"/>
+              <a:t>是怎么用的。</a:t>
+            </a:r>
+            <a:endParaRPr lang="en-US" altLang="zh-CN" dirty="0" smtClean="0"/>
+          </a:p>
+          <a:p>
+            <a:endParaRPr lang="en-US" altLang="zh-CN" dirty="0"/>
+          </a:p>
+          <a:p>
+            <a:r>
+              <a:rPr lang="zh-CN" altLang="en-US" dirty="0" smtClean="0"/>
+              <a:t>研究阴影在</a:t>
+            </a:r>
+            <a:r>
+              <a:rPr lang="en-US" altLang="zh-CN" dirty="0" err="1" smtClean="0"/>
+              <a:t>opengl</a:t>
+            </a:r>
+            <a:r>
+              <a:rPr lang="zh-CN" altLang="en-US" dirty="0" smtClean="0"/>
+              <a:t>是怎么用的，是否需要自己写。</a:t>
+            </a:r>
+            <a:endParaRPr lang="en-US" altLang="zh-CN" dirty="0" smtClean="0"/>
+          </a:p>
+          <a:p>
+            <a:endParaRPr lang="en-US" altLang="zh-CN" dirty="0"/>
+          </a:p>
+          <a:p>
+            <a:r>
+              <a:rPr lang="zh-CN" altLang="en-US" dirty="0" smtClean="0"/>
+              <a:t>编写物理模块。</a:t>
+            </a:r>
+            <a:endParaRPr lang="en-US" altLang="zh-CN" dirty="0" smtClean="0"/>
+          </a:p>
+          <a:p>
+            <a:endParaRPr lang="en-US" altLang="zh-CN" dirty="0" smtClean="0"/>
+          </a:p>
+          <a:p>
             <a:r>
               <a:rPr lang="zh-CN" altLang="en-US" dirty="0"/>
-              <a:t>信息</a:t>
-            </a:r>
-            <a:r>
-              <a:rPr lang="zh-CN" altLang="en-US" dirty="0" smtClean="0"/>
-              <a:t>。</a:t>
+              <a:t>导</a:t>
+            </a:r>
+            <a:r>
+              <a:rPr lang="zh-CN" altLang="en-US" dirty="0" smtClean="0"/>
+              <a:t>入人物，让人物在地面上移动。</a:t>
             </a:r>
             <a:endParaRPr lang="en-US" altLang="zh-CN" dirty="0" smtClean="0"/>
           </a:p>
@@ -3094,37 +3277,35 @@
           </a:p>
           <a:p>
             <a:r>
+              <a:rPr lang="zh-CN" altLang="en-US" dirty="0" smtClean="0"/>
+              <a:t>添加动画模块</a:t>
+            </a:r>
+            <a:endParaRPr lang="en-US" altLang="zh-CN" dirty="0" smtClean="0"/>
+          </a:p>
+          <a:p>
+            <a:endParaRPr lang="en-US" altLang="zh-CN" dirty="0"/>
+          </a:p>
+          <a:p>
+            <a:r>
+              <a:rPr lang="zh-CN" altLang="en-US" dirty="0" smtClean="0"/>
+              <a:t>添加</a:t>
+            </a:r>
+            <a:r>
               <a:rPr lang="en-US" altLang="zh-CN" dirty="0" smtClean="0"/>
-              <a:t>Actor</a:t>
-            </a:r>
-            <a:r>
-              <a:rPr lang="zh-CN" altLang="en-US" dirty="0" smtClean="0"/>
-              <a:t>以下不再分</a:t>
-            </a:r>
-            <a:r>
-              <a:rPr lang="en-US" altLang="zh-CN" dirty="0" smtClean="0"/>
-              <a:t>layer</a:t>
-            </a:r>
-            <a:r>
-              <a:rPr lang="zh-CN" altLang="en-US" dirty="0" smtClean="0"/>
-              <a:t>和非</a:t>
-            </a:r>
-            <a:r>
-              <a:rPr lang="en-US" altLang="zh-CN" dirty="0" smtClean="0"/>
-              <a:t>layer</a:t>
-            </a:r>
-            <a:r>
-              <a:rPr lang="zh-CN" altLang="en-US" dirty="0" smtClean="0"/>
-              <a:t>，接口和实现放在一起。</a:t>
-            </a:r>
-            <a:endParaRPr lang="en-US" altLang="zh-CN" dirty="0" smtClean="0"/>
+              <a:t>AI</a:t>
+            </a:r>
+            <a:r>
+              <a:rPr lang="zh-CN" altLang="en-US" dirty="0"/>
+              <a:t>模块</a:t>
+            </a:r>
+            <a:endParaRPr lang="en-US" altLang="zh-CN" dirty="0"/>
           </a:p>
         </p:txBody>
       </p:sp>
     </p:spTree>
     <p:extLst>
       <p:ext uri="{BB962C8B-B14F-4D97-AF65-F5344CB8AC3E}">
-        <p14:creationId xmlns:p14="http://schemas.microsoft.com/office/powerpoint/2010/main" val="1827119835"/>
+        <p14:creationId xmlns:p14="http://schemas.microsoft.com/office/powerpoint/2010/main" val="2489203389"/>
       </p:ext>
     </p:extLst>
   </p:cSld>
@@ -3159,8 +3340,8 @@
         </p:nvSpPr>
         <p:spPr>
           <a:xfrm>
-            <a:off x="0" y="1"/>
-            <a:ext cx="12192000" cy="1477328"/>
+            <a:off x="0" y="0"/>
+            <a:ext cx="12192000" cy="2862322"/>
           </a:xfrm>
           <a:prstGeom prst="rect">
             <a:avLst/>
@@ -3173,31 +3354,97 @@
           </a:bodyPr>
           <a:lstStyle/>
           <a:p>
+            <a:endParaRPr lang="en-US" altLang="zh-CN" dirty="0" smtClean="0"/>
+          </a:p>
+          <a:p>
             <a:r>
               <a:rPr lang="en-US" altLang="zh-CN" dirty="0" smtClean="0"/>
-              <a:t>Viewport</a:t>
-            </a:r>
-            <a:r>
-              <a:rPr lang="zh-CN" altLang="en-US" dirty="0" smtClean="0"/>
-              <a:t>中改</a:t>
-            </a:r>
-            <a:r>
-              <a:rPr lang="en-US" altLang="zh-CN" dirty="0" err="1" smtClean="0"/>
-              <a:t>shader</a:t>
+              <a:t>Layer </a:t>
+            </a:r>
+            <a:r>
+              <a:rPr lang="zh-CN" altLang="en-US" dirty="0" smtClean="0"/>
+              <a:t>拥有这一层的控制</a:t>
             </a:r>
             <a:endParaRPr lang="en-US" altLang="zh-CN" dirty="0" smtClean="0"/>
           </a:p>
           <a:p>
+            <a:r>
+              <a:rPr lang="zh-CN" altLang="en-US" dirty="0" smtClean="0"/>
+              <a:t>非</a:t>
+            </a:r>
+            <a:r>
+              <a:rPr lang="en-US" altLang="zh-CN" dirty="0" smtClean="0"/>
+              <a:t>layer</a:t>
+            </a:r>
+            <a:r>
+              <a:rPr lang="zh-CN" altLang="en-US" dirty="0" smtClean="0"/>
+              <a:t>拥有这一层的实体和功能实现</a:t>
+            </a:r>
+            <a:endParaRPr lang="en-US" altLang="zh-CN" dirty="0" smtClean="0"/>
+          </a:p>
+          <a:p>
             <a:endParaRPr lang="en-US" altLang="zh-CN" dirty="0"/>
           </a:p>
           <a:p>
             <a:r>
+              <a:rPr lang="zh-CN" altLang="en-US" dirty="0" smtClean="0"/>
+              <a:t>相当于</a:t>
+            </a:r>
+            <a:r>
               <a:rPr lang="en-US" altLang="zh-CN" dirty="0" smtClean="0"/>
-              <a:t>Level</a:t>
-            </a:r>
-            <a:r>
-              <a:rPr lang="zh-CN" altLang="en-US" dirty="0" smtClean="0"/>
-              <a:t>中加载模型</a:t>
+              <a:t>layer</a:t>
+            </a:r>
+            <a:r>
+              <a:rPr lang="zh-CN" altLang="en-US" dirty="0" smtClean="0"/>
+              <a:t>是这一层的</a:t>
+            </a:r>
+            <a:r>
+              <a:rPr lang="en-US" altLang="zh-CN" dirty="0" smtClean="0"/>
+              <a:t>public</a:t>
+            </a:r>
+          </a:p>
+          <a:p>
+            <a:r>
+              <a:rPr lang="zh-CN" altLang="en-US" dirty="0" smtClean="0"/>
+              <a:t>非</a:t>
+            </a:r>
+            <a:r>
+              <a:rPr lang="en-US" altLang="zh-CN" dirty="0" smtClean="0"/>
+              <a:t>layer</a:t>
+            </a:r>
+            <a:r>
+              <a:rPr lang="zh-CN" altLang="en-US" dirty="0" smtClean="0"/>
+              <a:t>是这一层的</a:t>
+            </a:r>
+            <a:r>
+              <a:rPr lang="en-US" altLang="zh-CN" dirty="0" smtClean="0"/>
+              <a:t>private</a:t>
+            </a:r>
+            <a:endParaRPr lang="en-US" altLang="zh-CN" dirty="0"/>
+          </a:p>
+          <a:p>
+            <a:endParaRPr lang="en-US" altLang="zh-CN" dirty="0"/>
+          </a:p>
+          <a:p>
+            <a:r>
+              <a:rPr lang="en-US" altLang="zh-CN" dirty="0" smtClean="0"/>
+              <a:t>Event</a:t>
+            </a:r>
+            <a:r>
+              <a:rPr lang="zh-CN" altLang="en-US" dirty="0" smtClean="0"/>
+              <a:t>在每一层中穿过，给每一层</a:t>
+            </a:r>
+            <a:r>
+              <a:rPr lang="en-US" altLang="zh-CN" dirty="0" smtClean="0"/>
+              <a:t>layer</a:t>
+            </a:r>
+            <a:r>
+              <a:rPr lang="zh-CN" altLang="en-US" dirty="0"/>
+              <a:t>信息</a:t>
+            </a:r>
+            <a:r>
+              <a:rPr lang="zh-CN" altLang="en-US" dirty="0" smtClean="0"/>
+              <a:t>。</a:t>
             </a:r>
             <a:endParaRPr lang="en-US" altLang="zh-CN" dirty="0" smtClean="0"/>
           </a:p>
@@ -3207,44 +3454,36 @@
           <a:p>
             <a:r>
               <a:rPr lang="en-US" altLang="zh-CN" dirty="0" smtClean="0"/>
-              <a:t>Model</a:t>
-            </a:r>
-            <a:r>
-              <a:rPr lang="zh-CN" altLang="en-US" dirty="0" smtClean="0"/>
-              <a:t>和</a:t>
-            </a:r>
-            <a:r>
-              <a:rPr lang="en-US" altLang="zh-CN" dirty="0"/>
-              <a:t>Mesh</a:t>
-            </a:r>
-            <a:r>
-              <a:rPr lang="zh-CN" altLang="en-US" dirty="0" smtClean="0"/>
-              <a:t>中改模型导入细节</a:t>
-            </a:r>
-            <a:r>
-              <a:rPr lang="zh-CN" altLang="en-US" dirty="0"/>
-              <a:t>，</a:t>
-            </a:r>
-            <a:r>
-              <a:rPr lang="zh-CN" altLang="en-US" dirty="0" smtClean="0"/>
-              <a:t>模型数据细节，与</a:t>
-            </a:r>
-            <a:r>
-              <a:rPr lang="en-US" altLang="zh-CN" dirty="0" err="1" smtClean="0"/>
-              <a:t>shader</a:t>
-            </a:r>
-            <a:r>
-              <a:rPr lang="zh-CN" altLang="en-US" dirty="0" smtClean="0"/>
-              <a:t>数据联系起来</a:t>
-            </a:r>
-            <a:endParaRPr lang="en-US" altLang="zh-CN" dirty="0"/>
+              <a:t>Actor</a:t>
+            </a:r>
+            <a:r>
+              <a:rPr lang="zh-CN" altLang="en-US" dirty="0" smtClean="0"/>
+              <a:t>以下不再分</a:t>
+            </a:r>
+            <a:r>
+              <a:rPr lang="en-US" altLang="zh-CN" dirty="0" smtClean="0"/>
+              <a:t>layer</a:t>
+            </a:r>
+            <a:r>
+              <a:rPr lang="zh-CN" altLang="en-US" dirty="0" smtClean="0"/>
+              <a:t>和非</a:t>
+            </a:r>
+            <a:r>
+              <a:rPr lang="en-US" altLang="zh-CN" dirty="0" smtClean="0"/>
+              <a:t>layer</a:t>
+            </a:r>
+            <a:r>
+              <a:rPr lang="zh-CN" altLang="en-US" dirty="0" smtClean="0"/>
+              <a:t>，接口和实现放在一起。</a:t>
+            </a:r>
+            <a:endParaRPr lang="en-US" altLang="zh-CN" dirty="0" smtClean="0"/>
           </a:p>
         </p:txBody>
       </p:sp>
     </p:spTree>
     <p:extLst>
       <p:ext uri="{BB962C8B-B14F-4D97-AF65-F5344CB8AC3E}">
-        <p14:creationId xmlns:p14="http://schemas.microsoft.com/office/powerpoint/2010/main" val="3795930902"/>
+        <p14:creationId xmlns:p14="http://schemas.microsoft.com/office/powerpoint/2010/main" val="1827119835"/>
       </p:ext>
     </p:extLst>
   </p:cSld>
@@ -3280,7 +3519,7 @@
         <p:spPr>
           <a:xfrm>
             <a:off x="0" y="1"/>
-            <a:ext cx="12192000" cy="7848302"/>
+            <a:ext cx="12192000" cy="1477328"/>
           </a:xfrm>
           <a:prstGeom prst="rect">
             <a:avLst/>
@@ -3295,127 +3534,16 @@
           <a:p>
             <a:r>
               <a:rPr lang="en-US" altLang="zh-CN" dirty="0" smtClean="0"/>
-              <a:t>//</a:t>
-            </a:r>
-            <a:r>
-              <a:rPr lang="en-US" altLang="zh-CN" dirty="0" err="1" smtClean="0"/>
-              <a:t>Key_repeate</a:t>
-            </a:r>
-            <a:r>
-              <a:rPr lang="zh-CN" altLang="en-US" dirty="0" smtClean="0"/>
-              <a:t>的速度只有帧率的</a:t>
-            </a:r>
-            <a:r>
-              <a:rPr lang="en-US" altLang="zh-CN" dirty="0" smtClean="0"/>
-              <a:t>1/3</a:t>
-            </a:r>
-            <a:r>
-              <a:rPr lang="zh-CN" altLang="en-US" dirty="0" smtClean="0"/>
-              <a:t>，移动时不够流畅，需要修改。</a:t>
-            </a:r>
-            <a:endParaRPr lang="en-US" altLang="zh-CN" dirty="0" smtClean="0"/>
-          </a:p>
-          <a:p>
-            <a:r>
-              <a:rPr lang="zh-CN" altLang="en-US" dirty="0" smtClean="0"/>
-              <a:t>添加响应鼠标按键、响应</a:t>
-            </a:r>
-            <a:r>
-              <a:rPr lang="en-US" altLang="zh-CN" dirty="0" smtClean="0"/>
-              <a:t>Mod</a:t>
-            </a:r>
-            <a:r>
-              <a:rPr lang="zh-CN" altLang="en-US" dirty="0" smtClean="0"/>
-              <a:t>切换功能。</a:t>
-            </a:r>
-            <a:endParaRPr lang="en-US" altLang="zh-CN" dirty="0" smtClean="0"/>
-          </a:p>
-          <a:p>
-            <a:endParaRPr lang="en-US" altLang="zh-CN" dirty="0"/>
-          </a:p>
-          <a:p>
-            <a:r>
-              <a:rPr lang="en-US" altLang="zh-CN" dirty="0" smtClean="0"/>
-              <a:t>//Camera</a:t>
-            </a:r>
-            <a:r>
-              <a:rPr lang="zh-CN" altLang="en-US" dirty="0" smtClean="0"/>
-              <a:t>只能在平面移动，需要添加自由移动。</a:t>
-            </a:r>
-            <a:endParaRPr lang="en-US" altLang="zh-CN" dirty="0" smtClean="0"/>
-          </a:p>
-          <a:p>
-            <a:endParaRPr lang="en-US" altLang="zh-CN" dirty="0" smtClean="0"/>
-          </a:p>
-          <a:p>
-            <a:r>
-              <a:rPr lang="en-US" altLang="zh-CN" dirty="0" smtClean="0"/>
-              <a:t>//</a:t>
-            </a:r>
-            <a:r>
-              <a:rPr lang="zh-CN" altLang="en-US" dirty="0" smtClean="0"/>
-              <a:t>看如何导入文件，</a:t>
-            </a:r>
-            <a:r>
-              <a:rPr lang="en-US" altLang="zh-CN" dirty="0" err="1" smtClean="0"/>
-              <a:t>assimp</a:t>
-            </a:r>
-            <a:r>
-              <a:rPr lang="zh-CN" altLang="en-US" dirty="0" smtClean="0"/>
-              <a:t>不能导入</a:t>
-            </a:r>
-            <a:r>
-              <a:rPr lang="en-US" altLang="zh-CN" dirty="0" err="1" smtClean="0"/>
-              <a:t>json</a:t>
-            </a:r>
-            <a:r>
-              <a:rPr lang="zh-CN" altLang="en-US" dirty="0" smtClean="0"/>
-              <a:t>文件，看</a:t>
-            </a:r>
-            <a:r>
-              <a:rPr lang="en-US" altLang="zh-CN" dirty="0" err="1" smtClean="0"/>
-              <a:t>quixel</a:t>
-            </a:r>
-            <a:r>
-              <a:rPr lang="zh-CN" altLang="en-US" dirty="0" smtClean="0"/>
-              <a:t>能不能导入其他类型的文件</a:t>
-            </a:r>
-            <a:endParaRPr lang="en-US" altLang="zh-CN" dirty="0" smtClean="0"/>
-          </a:p>
-          <a:p>
-            <a:endParaRPr lang="en-US" altLang="zh-CN" dirty="0"/>
-          </a:p>
-          <a:p>
-            <a:r>
-              <a:rPr lang="zh-CN" altLang="en-US" dirty="0" smtClean="0"/>
-              <a:t>自己导入贴图</a:t>
-            </a:r>
-            <a:endParaRPr lang="en-US" altLang="zh-CN" dirty="0"/>
-          </a:p>
-          <a:p>
-            <a:endParaRPr lang="en-US" altLang="zh-CN" dirty="0"/>
-          </a:p>
-          <a:p>
-            <a:r>
-              <a:rPr lang="zh-CN" altLang="en-US" dirty="0" smtClean="0"/>
-              <a:t>阅读</a:t>
-            </a:r>
-            <a:r>
-              <a:rPr lang="en-US" altLang="zh-CN" dirty="0" smtClean="0"/>
-              <a:t>PBR </a:t>
-            </a:r>
-            <a:r>
-              <a:rPr lang="zh-CN" altLang="en-US" dirty="0" smtClean="0"/>
-              <a:t>的</a:t>
+              <a:t>Viewport</a:t>
+            </a:r>
+            <a:r>
+              <a:rPr lang="zh-CN" altLang="en-US" dirty="0" smtClean="0"/>
+              <a:t>中改</a:t>
             </a:r>
             <a:r>
               <a:rPr lang="en-US" altLang="zh-CN" dirty="0" err="1" smtClean="0"/>
               <a:t>shader</a:t>
             </a:r>
-            <a:r>
-              <a:rPr lang="zh-CN" altLang="en-US" dirty="0" smtClean="0"/>
-              <a:t>文件。</a:t>
-            </a:r>
             <a:endParaRPr lang="en-US" altLang="zh-CN" dirty="0" smtClean="0"/>
           </a:p>
           <a:p>
@@ -3423,16 +3551,42 @@
           </a:p>
           <a:p>
             <a:r>
-              <a:rPr lang="zh-CN" altLang="en-US" dirty="0" smtClean="0"/>
-              <a:t>看</a:t>
-            </a:r>
-            <a:r>
-              <a:rPr lang="en-US" altLang="zh-CN" dirty="0" err="1" smtClean="0"/>
-              <a:t>quixel</a:t>
-            </a:r>
-            <a:r>
-              <a:rPr lang="zh-CN" altLang="en-US" dirty="0" smtClean="0"/>
-              <a:t>的文件与这个</a:t>
+              <a:rPr lang="en-US" altLang="zh-CN" dirty="0" smtClean="0"/>
+              <a:t>Level</a:t>
+            </a:r>
+            <a:r>
+              <a:rPr lang="zh-CN" altLang="en-US" dirty="0" smtClean="0"/>
+              <a:t>中加载模型</a:t>
+            </a:r>
+            <a:endParaRPr lang="en-US" altLang="zh-CN" dirty="0" smtClean="0"/>
+          </a:p>
+          <a:p>
+            <a:endParaRPr lang="en-US" altLang="zh-CN" dirty="0"/>
+          </a:p>
+          <a:p>
+            <a:r>
+              <a:rPr lang="en-US" altLang="zh-CN" dirty="0" smtClean="0"/>
+              <a:t>Model</a:t>
+            </a:r>
+            <a:r>
+              <a:rPr lang="zh-CN" altLang="en-US" dirty="0" smtClean="0"/>
+              <a:t>和</a:t>
+            </a:r>
+            <a:r>
+              <a:rPr lang="en-US" altLang="zh-CN" dirty="0"/>
+              <a:t>Mesh</a:t>
+            </a:r>
+            <a:r>
+              <a:rPr lang="zh-CN" altLang="en-US" dirty="0" smtClean="0"/>
+              <a:t>中改模型导入细节</a:t>
+            </a:r>
+            <a:r>
+              <a:rPr lang="zh-CN" altLang="en-US" dirty="0"/>
+              <a:t>，</a:t>
+            </a:r>
+            <a:r>
+              <a:rPr lang="zh-CN" altLang="en-US" dirty="0" smtClean="0"/>
+              <a:t>模型数据细节，与</a:t>
             </a:r>
             <a:r>
               <a:rPr lang="en-US" altLang="zh-CN" dirty="0" err="1" smtClean="0"/>
@@ -3440,135 +3594,7 @@
             </a:r>
             <a:r>
               <a:rPr lang="zh-CN" altLang="en-US" dirty="0" smtClean="0"/>
-              <a:t>合不合适。</a:t>
-            </a:r>
-            <a:endParaRPr lang="en-US" altLang="zh-CN" dirty="0" smtClean="0"/>
-          </a:p>
-          <a:p>
-            <a:endParaRPr lang="en-US" altLang="zh-CN" dirty="0"/>
-          </a:p>
-          <a:p>
-            <a:r>
-              <a:rPr lang="zh-CN" altLang="en-US" dirty="0" smtClean="0"/>
-              <a:t>添加高度图和物体位置生成。</a:t>
-            </a:r>
-            <a:endParaRPr lang="en-US" altLang="zh-CN" dirty="0" smtClean="0"/>
-          </a:p>
-          <a:p>
-            <a:endParaRPr lang="en-US" altLang="zh-CN" dirty="0"/>
-          </a:p>
-          <a:p>
-            <a:r>
-              <a:rPr lang="zh-CN" altLang="en-US" dirty="0" smtClean="0"/>
-              <a:t>添加二次元渲染</a:t>
-            </a:r>
-            <a:r>
-              <a:rPr lang="en-US" altLang="zh-CN" dirty="0" err="1" smtClean="0"/>
-              <a:t>shader</a:t>
-            </a:r>
-            <a:r>
-              <a:rPr lang="zh-CN" altLang="en-US" dirty="0" smtClean="0"/>
-              <a:t>。</a:t>
-            </a:r>
-            <a:endParaRPr lang="en-US" altLang="zh-CN" dirty="0" smtClean="0"/>
-          </a:p>
-          <a:p>
-            <a:endParaRPr lang="en-US" altLang="zh-CN" dirty="0"/>
-          </a:p>
-          <a:p>
-            <a:r>
-              <a:rPr lang="zh-CN" altLang="en-US" dirty="0" smtClean="0"/>
-              <a:t>研究</a:t>
-            </a:r>
-            <a:r>
-              <a:rPr lang="en-US" altLang="zh-CN" dirty="0" smtClean="0"/>
-              <a:t>AA</a:t>
-            </a:r>
-            <a:r>
-              <a:rPr lang="zh-CN" altLang="en-US" dirty="0" smtClean="0"/>
-              <a:t>在</a:t>
-            </a:r>
-            <a:r>
-              <a:rPr lang="en-US" altLang="zh-CN" dirty="0" err="1" smtClean="0"/>
-              <a:t>opengl</a:t>
-            </a:r>
-            <a:r>
-              <a:rPr lang="zh-CN" altLang="en-US" dirty="0" smtClean="0"/>
-              <a:t>是怎么用的。</a:t>
-            </a:r>
-            <a:endParaRPr lang="en-US" altLang="zh-CN" dirty="0" smtClean="0"/>
-          </a:p>
-          <a:p>
-            <a:endParaRPr lang="en-US" altLang="zh-CN" dirty="0"/>
-          </a:p>
-          <a:p>
-            <a:r>
-              <a:rPr lang="zh-CN" altLang="en-US" dirty="0" smtClean="0"/>
-              <a:t>研究阴影在</a:t>
-            </a:r>
-            <a:r>
-              <a:rPr lang="en-US" altLang="zh-CN" dirty="0" err="1" smtClean="0"/>
-              <a:t>opengl</a:t>
-            </a:r>
-            <a:r>
-              <a:rPr lang="zh-CN" altLang="en-US" dirty="0" smtClean="0"/>
-              <a:t>是怎么用的，是否需要自己写</a:t>
-            </a:r>
-            <a:r>
-              <a:rPr lang="zh-CN" altLang="en-US" dirty="0" smtClean="0"/>
-              <a:t>。</a:t>
-            </a:r>
-            <a:endParaRPr lang="en-US" altLang="zh-CN" dirty="0" smtClean="0"/>
-          </a:p>
-          <a:p>
-            <a:endParaRPr lang="en-US" altLang="zh-CN" dirty="0"/>
-          </a:p>
-          <a:p>
-            <a:r>
-              <a:rPr lang="zh-CN" altLang="en-US" dirty="0" smtClean="0"/>
-              <a:t>编写物理模块。</a:t>
-            </a:r>
-            <a:endParaRPr lang="en-US" altLang="zh-CN" dirty="0" smtClean="0"/>
-          </a:p>
-          <a:p>
-            <a:endParaRPr lang="en-US" altLang="zh-CN" dirty="0" smtClean="0"/>
-          </a:p>
-          <a:p>
-            <a:r>
-              <a:rPr lang="zh-CN" altLang="en-US" dirty="0"/>
-              <a:t>导</a:t>
-            </a:r>
-            <a:r>
-              <a:rPr lang="zh-CN" altLang="en-US" dirty="0" smtClean="0"/>
-              <a:t>入人物，让人物在地面上移动。</a:t>
-            </a:r>
-            <a:endParaRPr lang="en-US" altLang="zh-CN" dirty="0" smtClean="0"/>
-          </a:p>
-          <a:p>
-            <a:endParaRPr lang="en-US" altLang="zh-CN" dirty="0"/>
-          </a:p>
-          <a:p>
-            <a:r>
-              <a:rPr lang="zh-CN" altLang="en-US" dirty="0" smtClean="0"/>
-              <a:t>添加动画模块</a:t>
-            </a:r>
-            <a:endParaRPr lang="en-US" altLang="zh-CN" dirty="0" smtClean="0"/>
-          </a:p>
-          <a:p>
-            <a:endParaRPr lang="en-US" altLang="zh-CN" dirty="0"/>
-          </a:p>
-          <a:p>
-            <a:r>
-              <a:rPr lang="zh-CN" altLang="en-US" dirty="0" smtClean="0"/>
-              <a:t>添加</a:t>
-            </a:r>
-            <a:r>
-              <a:rPr lang="en-US" altLang="zh-CN" dirty="0" smtClean="0"/>
-              <a:t>AI</a:t>
-            </a:r>
-            <a:r>
-              <a:rPr lang="zh-CN" altLang="en-US" dirty="0"/>
-              <a:t>模块</a:t>
+              <a:t>数据联系起来</a:t>
             </a:r>
             <a:endParaRPr lang="en-US" altLang="zh-CN" dirty="0"/>
           </a:p>
@@ -3577,7 +3603,7 @@
     </p:spTree>
     <p:extLst>
       <p:ext uri="{BB962C8B-B14F-4D97-AF65-F5344CB8AC3E}">
-        <p14:creationId xmlns:p14="http://schemas.microsoft.com/office/powerpoint/2010/main" val="2489203389"/>
+        <p14:creationId xmlns:p14="http://schemas.microsoft.com/office/powerpoint/2010/main" val="3795930902"/>
       </p:ext>
     </p:extLst>
   </p:cSld>
@@ -4122,6 +4148,219 @@
     <p:extLst>
       <p:ext uri="{BB962C8B-B14F-4D97-AF65-F5344CB8AC3E}">
         <p14:creationId xmlns:p14="http://schemas.microsoft.com/office/powerpoint/2010/main" val="3055022421"/>
+      </p:ext>
+    </p:extLst>
+  </p:cSld>
+  <p:clrMapOvr>
+    <a:masterClrMapping/>
+  </p:clrMapOvr>
+</p:sld>
+</file>
+
+<file path=ppt/slides/slide6.xml><?xml version="1.0" encoding="utf-8"?>
+<p:sld xmlns:a="http://schemas.openxmlformats.org/drawingml/2006/main" xmlns:r="http://schemas.openxmlformats.org/officeDocument/2006/relationships" xmlns:p="http://schemas.openxmlformats.org/presentationml/2006/main">
+  <p:cSld>
+    <p:spTree>
+      <p:nvGrpSpPr>
+        <p:cNvPr id="1" name=""/>
+        <p:cNvGrpSpPr/>
+        <p:nvPr/>
+      </p:nvGrpSpPr>
+      <p:grpSpPr>
+        <a:xfrm>
+          <a:off x="0" y="0"/>
+          <a:ext cx="0" cy="0"/>
+          <a:chOff x="0" y="0"/>
+          <a:chExt cx="0" cy="0"/>
+        </a:xfrm>
+      </p:grpSpPr>
+      <p:sp>
+        <p:nvSpPr>
+          <p:cNvPr id="4" name="文本框 3"/>
+          <p:cNvSpPr txBox="1"/>
+          <p:nvPr/>
+        </p:nvSpPr>
+        <p:spPr>
+          <a:xfrm>
+            <a:off x="0" y="1"/>
+            <a:ext cx="12192000" cy="6740307"/>
+          </a:xfrm>
+          <a:prstGeom prst="rect">
+            <a:avLst/>
+          </a:prstGeom>
+          <a:noFill/>
+        </p:spPr>
+        <p:txBody>
+          <a:bodyPr wrap="square" rtlCol="0">
+            <a:spAutoFit/>
+          </a:bodyPr>
+          <a:lstStyle/>
+          <a:p>
+            <a:r>
+              <a:rPr lang="zh-CN" altLang="en-US" dirty="0" smtClean="0"/>
+              <a:t>地形和物件位置生成</a:t>
+            </a:r>
+            <a:endParaRPr lang="en-US" altLang="zh-CN" dirty="0" smtClean="0"/>
+          </a:p>
+          <a:p>
+            <a:endParaRPr lang="en-US" altLang="zh-CN" dirty="0" smtClean="0"/>
+          </a:p>
+          <a:p>
+            <a:r>
+              <a:rPr lang="zh-CN" altLang="en-US" dirty="0" smtClean="0"/>
+              <a:t>高度图</a:t>
+            </a:r>
+            <a:endParaRPr lang="en-US" altLang="zh-CN" dirty="0" smtClean="0"/>
+          </a:p>
+          <a:p>
+            <a:r>
+              <a:rPr lang="zh-CN" altLang="en-US" dirty="0" smtClean="0"/>
+              <a:t>根据山脉的形状和山丘的形状，山有三个参数，高度，长度，这些根据高斯来做。</a:t>
+            </a:r>
+            <a:endParaRPr lang="en-US" altLang="zh-CN" dirty="0" smtClean="0"/>
+          </a:p>
+          <a:p>
+            <a:r>
+              <a:rPr lang="zh-CN" altLang="en-US" dirty="0" smtClean="0"/>
+              <a:t>根据分型，来从大到小决定山的位置。</a:t>
+            </a:r>
+            <a:endParaRPr lang="en-US" altLang="zh-CN" dirty="0" smtClean="0"/>
+          </a:p>
+          <a:p>
+            <a:r>
+              <a:rPr lang="zh-CN" altLang="en-US" dirty="0" smtClean="0"/>
+              <a:t>根据真实情况，山重叠的部分去掉不用。</a:t>
+            </a:r>
+            <a:endParaRPr lang="en-US" altLang="zh-CN" dirty="0" smtClean="0"/>
+          </a:p>
+          <a:p>
+            <a:endParaRPr lang="en-US" altLang="zh-CN" dirty="0"/>
+          </a:p>
+          <a:p>
+            <a:r>
+              <a:rPr lang="zh-CN" altLang="en-US" dirty="0" smtClean="0"/>
+              <a:t>山脉有长度，长度可以量化为山峰数，</a:t>
+            </a:r>
+            <a:r>
+              <a:rPr lang="zh-CN" altLang="en-US" dirty="0"/>
+              <a:t>山脉的长度和山峰高度应该有关系</a:t>
+            </a:r>
+            <a:r>
+              <a:rPr lang="zh-CN" altLang="en-US" dirty="0" smtClean="0"/>
+              <a:t>，假定山峰</a:t>
+            </a:r>
+            <a:r>
+              <a:rPr lang="zh-CN" altLang="en-US" dirty="0"/>
+              <a:t>数和主峰高度正相关</a:t>
+            </a:r>
+            <a:r>
+              <a:rPr lang="zh-CN" altLang="en-US" dirty="0" smtClean="0"/>
+              <a:t>，再假定</a:t>
+            </a:r>
+            <a:r>
+              <a:rPr lang="zh-CN" altLang="en-US" dirty="0"/>
+              <a:t>只有一个主峰，离主峰越远，山峰越低</a:t>
+            </a:r>
+            <a:r>
+              <a:rPr lang="zh-CN" altLang="en-US" dirty="0" smtClean="0"/>
+              <a:t>，下一个山峰相对这一座山峰的高度、距离根据高斯来生成，一个点若有多座山峰影响，若高度差不多，则降低高度，若高度差一些，则抬高高度，若高度差很多，则不影响，一次算两个山峰，算出的直接与下一个山峰再算。一座山脉生成完毕后，将生成新的山脉，新的山脉应该避开已有山脉。山脉生成完毕后，再生成山丘，山丘应该避开山脉。</a:t>
+            </a:r>
+            <a:endParaRPr lang="en-US" altLang="zh-CN" dirty="0" smtClean="0"/>
+          </a:p>
+          <a:p>
+            <a:endParaRPr lang="en-US" altLang="zh-CN" dirty="0" smtClean="0"/>
+          </a:p>
+          <a:p>
+            <a:endParaRPr lang="en-US" altLang="zh-CN" dirty="0" smtClean="0"/>
+          </a:p>
+          <a:p>
+            <a:endParaRPr lang="en-US" altLang="zh-CN" dirty="0"/>
+          </a:p>
+          <a:p>
+            <a:r>
+              <a:rPr lang="zh-CN" altLang="en-US" dirty="0" smtClean="0"/>
+              <a:t>三</a:t>
+            </a:r>
+            <a:r>
+              <a:rPr lang="zh-CN" altLang="en-US" dirty="0"/>
+              <a:t>角化，生成定点法线</a:t>
+            </a:r>
+            <a:r>
+              <a:rPr lang="zh-CN" altLang="en-US" dirty="0" smtClean="0"/>
+              <a:t>，</a:t>
+            </a:r>
+            <a:endParaRPr lang="en-US" altLang="zh-CN" dirty="0" smtClean="0"/>
+          </a:p>
+          <a:p>
+            <a:endParaRPr lang="en-US" altLang="zh-CN" dirty="0" smtClean="0"/>
+          </a:p>
+          <a:p>
+            <a:endParaRPr lang="en-US" altLang="zh-CN" dirty="0"/>
+          </a:p>
+          <a:p>
+            <a:r>
+              <a:rPr lang="zh-CN" altLang="en-US" dirty="0"/>
+              <a:t>有的贴图是小物件，根据大物件位置来摆放；有的贴图是大环境，需要在物件</a:t>
+            </a:r>
+            <a:r>
+              <a:rPr lang="zh-CN" altLang="en-US"/>
+              <a:t>摆放</a:t>
+            </a:r>
+            <a:r>
+              <a:rPr lang="zh-CN" altLang="en-US" smtClean="0"/>
+              <a:t>之前放</a:t>
+            </a:r>
+            <a:r>
+              <a:rPr lang="zh-CN" altLang="en-US" dirty="0"/>
+              <a:t>好</a:t>
+            </a:r>
+            <a:endParaRPr lang="en-US" altLang="zh-CN" dirty="0"/>
+          </a:p>
+          <a:p>
+            <a:endParaRPr lang="en-US" altLang="zh-CN" dirty="0"/>
+          </a:p>
+          <a:p>
+            <a:endParaRPr lang="en-US" altLang="zh-CN" dirty="0"/>
+          </a:p>
+          <a:p>
+            <a:r>
+              <a:rPr lang="zh-CN" altLang="en-US" dirty="0" smtClean="0"/>
+              <a:t>生成物件位置</a:t>
+            </a:r>
+            <a:endParaRPr lang="en-US" altLang="zh-CN" dirty="0" smtClean="0"/>
+          </a:p>
+          <a:p>
+            <a:endParaRPr lang="en-US" altLang="zh-CN" dirty="0" smtClean="0"/>
+          </a:p>
+          <a:p>
+            <a:r>
+              <a:rPr lang="zh-CN" altLang="en-US" dirty="0" smtClean="0"/>
+              <a:t>选择</a:t>
+            </a:r>
+            <a:r>
+              <a:rPr lang="zh-CN" altLang="en-US" dirty="0"/>
+              <a:t>纹理坐标，添加多层贴图，改专属</a:t>
+            </a:r>
+            <a:r>
+              <a:rPr lang="en-US" altLang="zh-CN" dirty="0" err="1"/>
+              <a:t>shader</a:t>
+            </a:r>
+            <a:r>
+              <a:rPr lang="zh-CN" altLang="en-US" dirty="0"/>
+              <a:t>将每层结果根据高度、分型、高斯</a:t>
+            </a:r>
+            <a:r>
+              <a:rPr lang="zh-CN" altLang="en-US" dirty="0" smtClean="0"/>
+              <a:t>叠加</a:t>
+            </a:r>
+            <a:endParaRPr lang="en-US" altLang="zh-CN" dirty="0" smtClean="0"/>
+          </a:p>
+        </p:txBody>
+      </p:sp>
+    </p:spTree>
+    <p:extLst>
+      <p:ext uri="{BB962C8B-B14F-4D97-AF65-F5344CB8AC3E}">
+        <p14:creationId xmlns:p14="http://schemas.microsoft.com/office/powerpoint/2010/main" val="2643404927"/>
       </p:ext>
     </p:extLst>
   </p:cSld>

</xml_diff>

<commit_message>
improved the landscapeMesh and added some files
</commit_message>
<xml_diff>
--- a/未来修改.pptx
+++ b/未来修改.pptx
@@ -21,6 +21,7 @@
     <p:sldId id="268" r:id="rId15"/>
     <p:sldId id="269" r:id="rId16"/>
     <p:sldId id="273" r:id="rId17"/>
+    <p:sldId id="275" r:id="rId18"/>
   </p:sldIdLst>
   <p:sldSz cx="12192000" cy="6858000"/>
   <p:notesSz cx="6858000" cy="9144000"/>
@@ -258,7 +259,7 @@
           <a:p>
             <a:fld id="{2B65E6A6-E877-45D0-B8F9-A137E1AC6DD2}" type="datetimeFigureOut">
               <a:rPr lang="zh-CN" altLang="en-US" smtClean="0"/>
-              <a:t>2021/3/14</a:t>
+              <a:t>2021/3/15</a:t>
             </a:fld>
             <a:endParaRPr lang="zh-CN" altLang="en-US"/>
           </a:p>
@@ -428,7 +429,7 @@
           <a:p>
             <a:fld id="{2B65E6A6-E877-45D0-B8F9-A137E1AC6DD2}" type="datetimeFigureOut">
               <a:rPr lang="zh-CN" altLang="en-US" smtClean="0"/>
-              <a:t>2021/3/14</a:t>
+              <a:t>2021/3/15</a:t>
             </a:fld>
             <a:endParaRPr lang="zh-CN" altLang="en-US"/>
           </a:p>
@@ -608,7 +609,7 @@
           <a:p>
             <a:fld id="{2B65E6A6-E877-45D0-B8F9-A137E1AC6DD2}" type="datetimeFigureOut">
               <a:rPr lang="zh-CN" altLang="en-US" smtClean="0"/>
-              <a:t>2021/3/14</a:t>
+              <a:t>2021/3/15</a:t>
             </a:fld>
             <a:endParaRPr lang="zh-CN" altLang="en-US"/>
           </a:p>
@@ -778,7 +779,7 @@
           <a:p>
             <a:fld id="{2B65E6A6-E877-45D0-B8F9-A137E1AC6DD2}" type="datetimeFigureOut">
               <a:rPr lang="zh-CN" altLang="en-US" smtClean="0"/>
-              <a:t>2021/3/14</a:t>
+              <a:t>2021/3/15</a:t>
             </a:fld>
             <a:endParaRPr lang="zh-CN" altLang="en-US"/>
           </a:p>
@@ -1024,7 +1025,7 @@
           <a:p>
             <a:fld id="{2B65E6A6-E877-45D0-B8F9-A137E1AC6DD2}" type="datetimeFigureOut">
               <a:rPr lang="zh-CN" altLang="en-US" smtClean="0"/>
-              <a:t>2021/3/14</a:t>
+              <a:t>2021/3/15</a:t>
             </a:fld>
             <a:endParaRPr lang="zh-CN" altLang="en-US"/>
           </a:p>
@@ -1256,7 +1257,7 @@
           <a:p>
             <a:fld id="{2B65E6A6-E877-45D0-B8F9-A137E1AC6DD2}" type="datetimeFigureOut">
               <a:rPr lang="zh-CN" altLang="en-US" smtClean="0"/>
-              <a:t>2021/3/14</a:t>
+              <a:t>2021/3/15</a:t>
             </a:fld>
             <a:endParaRPr lang="zh-CN" altLang="en-US"/>
           </a:p>
@@ -1623,7 +1624,7 @@
           <a:p>
             <a:fld id="{2B65E6A6-E877-45D0-B8F9-A137E1AC6DD2}" type="datetimeFigureOut">
               <a:rPr lang="zh-CN" altLang="en-US" smtClean="0"/>
-              <a:t>2021/3/14</a:t>
+              <a:t>2021/3/15</a:t>
             </a:fld>
             <a:endParaRPr lang="zh-CN" altLang="en-US"/>
           </a:p>
@@ -1741,7 +1742,7 @@
           <a:p>
             <a:fld id="{2B65E6A6-E877-45D0-B8F9-A137E1AC6DD2}" type="datetimeFigureOut">
               <a:rPr lang="zh-CN" altLang="en-US" smtClean="0"/>
-              <a:t>2021/3/14</a:t>
+              <a:t>2021/3/15</a:t>
             </a:fld>
             <a:endParaRPr lang="zh-CN" altLang="en-US"/>
           </a:p>
@@ -1836,7 +1837,7 @@
           <a:p>
             <a:fld id="{2B65E6A6-E877-45D0-B8F9-A137E1AC6DD2}" type="datetimeFigureOut">
               <a:rPr lang="zh-CN" altLang="en-US" smtClean="0"/>
-              <a:t>2021/3/14</a:t>
+              <a:t>2021/3/15</a:t>
             </a:fld>
             <a:endParaRPr lang="zh-CN" altLang="en-US"/>
           </a:p>
@@ -2113,7 +2114,7 @@
           <a:p>
             <a:fld id="{2B65E6A6-E877-45D0-B8F9-A137E1AC6DD2}" type="datetimeFigureOut">
               <a:rPr lang="zh-CN" altLang="en-US" smtClean="0"/>
-              <a:t>2021/3/14</a:t>
+              <a:t>2021/3/15</a:t>
             </a:fld>
             <a:endParaRPr lang="zh-CN" altLang="en-US"/>
           </a:p>
@@ -2366,7 +2367,7 @@
           <a:p>
             <a:fld id="{2B65E6A6-E877-45D0-B8F9-A137E1AC6DD2}" type="datetimeFigureOut">
               <a:rPr lang="zh-CN" altLang="en-US" smtClean="0"/>
-              <a:t>2021/3/14</a:t>
+              <a:t>2021/3/15</a:t>
             </a:fld>
             <a:endParaRPr lang="zh-CN" altLang="en-US"/>
           </a:p>
@@ -2579,7 +2580,7 @@
           <a:p>
             <a:fld id="{2B65E6A6-E877-45D0-B8F9-A137E1AC6DD2}" type="datetimeFigureOut">
               <a:rPr lang="zh-CN" altLang="en-US" smtClean="0"/>
-              <a:t>2021/3/14</a:t>
+              <a:t>2021/3/15</a:t>
             </a:fld>
             <a:endParaRPr lang="zh-CN" altLang="en-US"/>
           </a:p>
@@ -6223,11 +6224,7 @@
             </a:r>
             <a:r>
               <a:rPr lang="en-US" altLang="zh-CN" dirty="0" smtClean="0"/>
-              <a:t>event</a:t>
-            </a:r>
-            <a:r>
-              <a:rPr lang="en-US" altLang="zh-CN" dirty="0" smtClean="0"/>
-              <a:t> error</a:t>
+              <a:t>event error</a:t>
             </a:r>
             <a:r>
               <a:rPr lang="zh-CN" altLang="en-US" dirty="0" smtClean="0"/>
@@ -6410,6 +6407,234 @@
     <p:extLst>
       <p:ext uri="{BB962C8B-B14F-4D97-AF65-F5344CB8AC3E}">
         <p14:creationId xmlns:p14="http://schemas.microsoft.com/office/powerpoint/2010/main" val="2602321658"/>
+      </p:ext>
+    </p:extLst>
+  </p:cSld>
+  <p:clrMapOvr>
+    <a:masterClrMapping/>
+  </p:clrMapOvr>
+</p:sld>
+</file>
+
+<file path=ppt/slides/slide17.xml><?xml version="1.0" encoding="utf-8"?>
+<p:sld xmlns:a="http://schemas.openxmlformats.org/drawingml/2006/main" xmlns:r="http://schemas.openxmlformats.org/officeDocument/2006/relationships" xmlns:p="http://schemas.openxmlformats.org/presentationml/2006/main">
+  <p:cSld>
+    <p:spTree>
+      <p:nvGrpSpPr>
+        <p:cNvPr id="1" name=""/>
+        <p:cNvGrpSpPr/>
+        <p:nvPr/>
+      </p:nvGrpSpPr>
+      <p:grpSpPr>
+        <a:xfrm>
+          <a:off x="0" y="0"/>
+          <a:ext cx="0" cy="0"/>
+          <a:chOff x="0" y="0"/>
+          <a:chExt cx="0" cy="0"/>
+        </a:xfrm>
+      </p:grpSpPr>
+      <p:sp>
+        <p:nvSpPr>
+          <p:cNvPr id="4" name="文本框 3"/>
+          <p:cNvSpPr txBox="1"/>
+          <p:nvPr/>
+        </p:nvSpPr>
+        <p:spPr>
+          <a:xfrm>
+            <a:off x="0" y="1"/>
+            <a:ext cx="12192000" cy="3139321"/>
+          </a:xfrm>
+          <a:prstGeom prst="rect">
+            <a:avLst/>
+          </a:prstGeom>
+          <a:noFill/>
+        </p:spPr>
+        <p:txBody>
+          <a:bodyPr wrap="square" rtlCol="0">
+            <a:spAutoFit/>
+          </a:bodyPr>
+          <a:lstStyle/>
+          <a:p>
+            <a:r>
+              <a:rPr lang="en-US" altLang="zh-CN" dirty="0" smtClean="0"/>
+              <a:t>Displacement </a:t>
+            </a:r>
+            <a:r>
+              <a:rPr lang="zh-CN" altLang="en-US" dirty="0" smtClean="0"/>
+              <a:t>设想深度图在三角形所在切线空间内。对于点法线不垂直于三角形所在面的情况，比如三角形三个顶点的法线不同，或是视线穿过了当前三角形，而下一个三角形的法线方向与这一个三角形的法线方向不同的情况，这个设想就是不成立的。</a:t>
+            </a:r>
+            <a:endParaRPr lang="en-US" altLang="zh-CN" dirty="0" smtClean="0"/>
+          </a:p>
+          <a:p>
+            <a:r>
+              <a:rPr lang="en-US" altLang="zh-CN" dirty="0" smtClean="0"/>
+              <a:t>Displacement</a:t>
+            </a:r>
+            <a:r>
+              <a:rPr lang="zh-CN" altLang="en-US" dirty="0"/>
+              <a:t>的</a:t>
+            </a:r>
+            <a:r>
+              <a:rPr lang="zh-CN" altLang="en-US" dirty="0" smtClean="0"/>
+              <a:t>视线可能穿过</a:t>
+            </a:r>
+            <a:r>
+              <a:rPr lang="en-US" altLang="zh-CN" dirty="0" smtClean="0"/>
+              <a:t>texture</a:t>
+            </a:r>
+            <a:r>
+              <a:rPr lang="zh-CN" altLang="en-US" dirty="0" smtClean="0"/>
+              <a:t>，即</a:t>
+            </a:r>
+            <a:r>
+              <a:rPr lang="en-US" altLang="zh-CN" dirty="0" err="1" smtClean="0"/>
+              <a:t>u+v</a:t>
+            </a:r>
+            <a:r>
+              <a:rPr lang="zh-CN" altLang="en-US" dirty="0"/>
+              <a:t>超过了</a:t>
+            </a:r>
+            <a:r>
+              <a:rPr lang="en-US" altLang="zh-CN" dirty="0" smtClean="0"/>
+              <a:t>1</a:t>
+            </a:r>
+            <a:r>
+              <a:rPr lang="zh-CN" altLang="en-US" dirty="0" smtClean="0"/>
+              <a:t>或者</a:t>
+            </a:r>
+            <a:r>
+              <a:rPr lang="en-US" altLang="zh-CN" dirty="0" smtClean="0"/>
+              <a:t>u</a:t>
+            </a:r>
+            <a:r>
+              <a:rPr lang="zh-CN" altLang="en-US" dirty="0" smtClean="0"/>
+              <a:t>、</a:t>
+            </a:r>
+            <a:r>
+              <a:rPr lang="en-US" altLang="zh-CN" dirty="0" smtClean="0"/>
+              <a:t>v</a:t>
+            </a:r>
+            <a:r>
+              <a:rPr lang="zh-CN" altLang="en-US" dirty="0" smtClean="0"/>
+              <a:t>中有负数，这种情况下应该让片段透明。</a:t>
+            </a:r>
+            <a:endParaRPr lang="en-US" altLang="zh-CN" dirty="0" smtClean="0"/>
+          </a:p>
+          <a:p>
+            <a:endParaRPr lang="en-US" altLang="zh-CN" dirty="0"/>
+          </a:p>
+          <a:p>
+            <a:r>
+              <a:rPr lang="zh-CN" altLang="en-US" dirty="0" smtClean="0"/>
+              <a:t>法线贴图。一个点可能是多个三角形的顶点，这时它的法线怎么算呢？如果让点的法线垂直于三角形所在面，则三角形与三角形之间的法线会存在断裂的情况。解决办法是加权平均顶点的各个三角形法线，权值是顶点对应的角的角度，比如一个顶点对应三个三角形，点所在角的角度分别是</a:t>
+            </a:r>
+            <a:r>
+              <a:rPr lang="en-US" altLang="zh-CN" dirty="0" smtClean="0"/>
+              <a:t>120</a:t>
+            </a:r>
+            <a:r>
+              <a:rPr lang="zh-CN" altLang="en-US" dirty="0" smtClean="0"/>
+              <a:t>度、</a:t>
+            </a:r>
+            <a:r>
+              <a:rPr lang="en-US" altLang="zh-CN" dirty="0" smtClean="0"/>
+              <a:t>110</a:t>
+            </a:r>
+            <a:r>
+              <a:rPr lang="zh-CN" altLang="en-US" dirty="0" smtClean="0"/>
+              <a:t>度、</a:t>
+            </a:r>
+            <a:r>
+              <a:rPr lang="en-US" altLang="zh-CN" dirty="0" smtClean="0"/>
+              <a:t>130</a:t>
+            </a:r>
+            <a:r>
+              <a:rPr lang="zh-CN" altLang="en-US" dirty="0" smtClean="0"/>
+              <a:t>度，法线分别是</a:t>
+            </a:r>
+            <a:r>
+              <a:rPr lang="en-US" altLang="zh-CN" dirty="0" smtClean="0"/>
+              <a:t>n1</a:t>
+            </a:r>
+            <a:r>
+              <a:rPr lang="zh-CN" altLang="en-US" dirty="0" smtClean="0"/>
+              <a:t>、</a:t>
+            </a:r>
+            <a:r>
+              <a:rPr lang="en-US" altLang="zh-CN" dirty="0" smtClean="0"/>
+              <a:t>n2</a:t>
+            </a:r>
+            <a:r>
+              <a:rPr lang="zh-CN" altLang="en-US" dirty="0" smtClean="0"/>
+              <a:t>、</a:t>
+            </a:r>
+            <a:r>
+              <a:rPr lang="en-US" altLang="zh-CN" dirty="0" smtClean="0"/>
+              <a:t>n3</a:t>
+            </a:r>
+            <a:r>
+              <a:rPr lang="zh-CN" altLang="en-US" dirty="0" smtClean="0"/>
+              <a:t>，那么加权后法线为</a:t>
+            </a:r>
+            <a:r>
+              <a:rPr lang="en-US" altLang="zh-CN" dirty="0" smtClean="0"/>
+              <a:t>120/360 * n1 + 110/360 </a:t>
+            </a:r>
+            <a:r>
+              <a:rPr lang="en-US" altLang="zh-CN" dirty="0"/>
+              <a:t>* </a:t>
+            </a:r>
+            <a:r>
+              <a:rPr lang="en-US" altLang="zh-CN" dirty="0" smtClean="0"/>
+              <a:t>n2 + 130/360 </a:t>
+            </a:r>
+            <a:r>
+              <a:rPr lang="en-US" altLang="zh-CN" dirty="0"/>
+              <a:t>* </a:t>
+            </a:r>
+            <a:r>
+              <a:rPr lang="en-US" altLang="zh-CN" dirty="0" smtClean="0"/>
+              <a:t>n3</a:t>
+            </a:r>
+            <a:r>
+              <a:rPr lang="zh-CN" altLang="en-US" dirty="0" smtClean="0"/>
+              <a:t>。</a:t>
+            </a:r>
+            <a:endParaRPr lang="en-US" altLang="zh-CN" dirty="0" smtClean="0"/>
+          </a:p>
+          <a:p>
+            <a:r>
+              <a:rPr lang="zh-CN" altLang="en-US" dirty="0"/>
+              <a:t>这</a:t>
+            </a:r>
+            <a:r>
+              <a:rPr lang="zh-CN" altLang="en-US" dirty="0" smtClean="0"/>
+              <a:t>又带来一个新的问题，片段的法线取的是顶点法线的三角形</a:t>
+            </a:r>
+            <a:r>
+              <a:rPr lang="en-US" altLang="zh-CN" dirty="0" err="1" smtClean="0"/>
+              <a:t>uv</a:t>
+            </a:r>
+            <a:r>
+              <a:rPr lang="zh-CN" altLang="en-US" dirty="0" smtClean="0"/>
+              <a:t>插值，这样片段法线的模就不保证是</a:t>
+            </a:r>
+            <a:r>
+              <a:rPr lang="en-US" altLang="zh-CN" dirty="0" smtClean="0"/>
+              <a:t>1</a:t>
+            </a:r>
+            <a:r>
+              <a:rPr lang="zh-CN" altLang="en-US" dirty="0" smtClean="0"/>
+              <a:t>了。所以应该在着色器中将插值得来的法线归一化。</a:t>
+            </a:r>
+            <a:endParaRPr lang="en-US" altLang="zh-CN" dirty="0"/>
+          </a:p>
+        </p:txBody>
+      </p:sp>
+    </p:spTree>
+    <p:extLst>
+      <p:ext uri="{BB962C8B-B14F-4D97-AF65-F5344CB8AC3E}">
+        <p14:creationId xmlns:p14="http://schemas.microsoft.com/office/powerpoint/2010/main" val="433364741"/>
       </p:ext>
     </p:extLst>
   </p:cSld>

</xml_diff>